<commit_message>
Multiple slides working, text box added
</commit_message>
<xml_diff>
--- a/test/bin/PPSimpleExamples.pptx
+++ b/test/bin/PPSimpleExamples.pptx
@@ -9,6 +9,8 @@
   </p:notesMasterIdLst>
   <p:sldIdLst>
     <p:sldId id="517" r:id="rId101"/>
+    <p:sldId id="518" r:id="rId102"/>
+    <p:sldId id="519" r:id="rId103"/>
   </p:sldIdLst>
   <p:sldSz cx="9144000" cy="6858000" type="screen4x3"/>
   <p:notesSz cx="9144000" cy="6858000"/>
@@ -579,6 +581,202 @@
 </file>
 
 <file path=ppt/notesSlides/notesSlide1.xml><?xml version="1.0" encoding="utf-8"?>
+<p:notes xmlns:a="http://schemas.openxmlformats.org/drawingml/2006/main" xmlns:r="http://schemas.openxmlformats.org/officeDocument/2006/relationships" xmlns:mc="http://schemas.openxmlformats.org/markup-compatibility/2006" xmlns:mv="urn:schemas-microsoft-com:mac:vml" xmlns:p="http://schemas.openxmlformats.org/presentationml/2006/main" mc:Ignorable="mv" mc:PreserveAttributes="mv:*">
+  <p:cSld>
+    <p:spTree>
+      <p:nvGrpSpPr>
+        <p:cNvPr id="0" name="title"/>
+        <p:cNvGrpSpPr/>
+        <p:nvPr/>
+      </p:nvGrpSpPr>
+      <p:grpSpPr>
+        <a:xfrm>
+          <a:off x="0" y="0"/>
+          <a:ext cx="0" cy="0"/>
+          <a:chOff x="0" y="0"/>
+          <a:chExt cx="0" cy="0"/>
+        </a:xfrm>
+      </p:grpSpPr>
+      <p:sp>
+        <p:nvSpPr>
+          <p:cNvPr id="135170" name="Rectangle 2"/>
+          <p:cNvSpPr>
+            <a:spLocks noGrp="1" noRot="1" noChangeAspect="1" noChangeArrowheads="1"/>
+          </p:cNvSpPr>
+          <p:nvPr>
+            <p:ph type="sldImg"/>
+          </p:nvPr>
+        </p:nvSpPr>
+        <p:spPr bwMode="auto">
+          <a:xfrm>
+            <a:off x="2844800" y="533400"/>
+            <a:ext cx="3454400" cy="2590800"/>
+          </a:xfrm>
+          <a:prstGeom prst="rect">
+            <a:avLst/>
+          </a:prstGeom>
+          <a:solidFill>
+            <a:srgbClr val="FFFFFF"/>
+          </a:solidFill>
+          <a:ln>
+            <a:solidFill>
+              <a:srgbClr val="000000"/>
+            </a:solidFill>
+            <a:miter lim="800000"/>
+            <a:headEnd/>
+            <a:tailEnd/>
+          </a:ln>
+        </p:spPr>
+      </p:sp>
+      <p:sp>
+        <p:nvSpPr>
+          <p:cNvPr id="135171" name="Rectangle 3"/>
+          <p:cNvSpPr>
+            <a:spLocks noGrp="1" noChangeArrowheads="1"/>
+          </p:cNvSpPr>
+          <p:nvPr>
+            <p:ph type="body" idx="1"/>
+          </p:nvPr>
+        </p:nvSpPr>
+        <p:spPr bwMode="auto">
+          <a:xfrm>
+            <a:off x="1219200" y="3276600"/>
+            <a:ext cx="6705600" cy="3048000"/>
+          </a:xfrm>
+          <a:prstGeom prst="rect">
+            <a:avLst/>
+          </a:prstGeom>
+          <a:solidFill>
+            <a:srgbClr val="FFFFFF"/>
+          </a:solidFill>
+          <a:ln>
+            <a:solidFill>
+              <a:srgbClr val="000000"/>
+            </a:solidFill>
+            <a:miter lim="800000"/>
+            <a:headEnd/>
+            <a:tailEnd/>
+          </a:ln>
+        </p:spPr>
+        <p:txBody>
+          <a:bodyPr>
+            <a:prstTxWarp prst="textNoShape">
+              <a:avLst/>
+            </a:prstTxWarp>
+          </a:bodyPr>
+          <a:lstStyle/>
+          <a:p>
+            <a:endParaRPr lang="en-US"/>
+          </a:p>
+        </p:txBody>
+      </p:sp>
+    </p:spTree>
+  </p:cSld>
+  <p:clrMapOvr>
+    <a:masterClrMapping/>
+  </p:clrMapOvr>
+</p:notes>
+</file>
+
+<file path=ppt/notesSlides/notesSlide2.xml><?xml version="1.0" encoding="utf-8"?>
+<p:notes xmlns:a="http://schemas.openxmlformats.org/drawingml/2006/main" xmlns:r="http://schemas.openxmlformats.org/officeDocument/2006/relationships" xmlns:mc="http://schemas.openxmlformats.org/markup-compatibility/2006" xmlns:mv="urn:schemas-microsoft-com:mac:vml" xmlns:p="http://schemas.openxmlformats.org/presentationml/2006/main" mc:Ignorable="mv" mc:PreserveAttributes="mv:*">
+  <p:cSld>
+    <p:spTree>
+      <p:nvGrpSpPr>
+        <p:cNvPr id="0" name="title"/>
+        <p:cNvGrpSpPr/>
+        <p:nvPr/>
+      </p:nvGrpSpPr>
+      <p:grpSpPr>
+        <a:xfrm>
+          <a:off x="0" y="0"/>
+          <a:ext cx="0" cy="0"/>
+          <a:chOff x="0" y="0"/>
+          <a:chExt cx="0" cy="0"/>
+        </a:xfrm>
+      </p:grpSpPr>
+      <p:sp>
+        <p:nvSpPr>
+          <p:cNvPr id="135170" name="Rectangle 2"/>
+          <p:cNvSpPr>
+            <a:spLocks noGrp="1" noRot="1" noChangeAspect="1" noChangeArrowheads="1"/>
+          </p:cNvSpPr>
+          <p:nvPr>
+            <p:ph type="sldImg"/>
+          </p:nvPr>
+        </p:nvSpPr>
+        <p:spPr bwMode="auto">
+          <a:xfrm>
+            <a:off x="2844800" y="533400"/>
+            <a:ext cx="3454400" cy="2590800"/>
+          </a:xfrm>
+          <a:prstGeom prst="rect">
+            <a:avLst/>
+          </a:prstGeom>
+          <a:solidFill>
+            <a:srgbClr val="FFFFFF"/>
+          </a:solidFill>
+          <a:ln>
+            <a:solidFill>
+              <a:srgbClr val="000000"/>
+            </a:solidFill>
+            <a:miter lim="800000"/>
+            <a:headEnd/>
+            <a:tailEnd/>
+          </a:ln>
+        </p:spPr>
+      </p:sp>
+      <p:sp>
+        <p:nvSpPr>
+          <p:cNvPr id="135171" name="Rectangle 3"/>
+          <p:cNvSpPr>
+            <a:spLocks noGrp="1" noChangeArrowheads="1"/>
+          </p:cNvSpPr>
+          <p:nvPr>
+            <p:ph type="body" idx="1"/>
+          </p:nvPr>
+        </p:nvSpPr>
+        <p:spPr bwMode="auto">
+          <a:xfrm>
+            <a:off x="1219200" y="3276600"/>
+            <a:ext cx="6705600" cy="3048000"/>
+          </a:xfrm>
+          <a:prstGeom prst="rect">
+            <a:avLst/>
+          </a:prstGeom>
+          <a:solidFill>
+            <a:srgbClr val="FFFFFF"/>
+          </a:solidFill>
+          <a:ln>
+            <a:solidFill>
+              <a:srgbClr val="000000"/>
+            </a:solidFill>
+            <a:miter lim="800000"/>
+            <a:headEnd/>
+            <a:tailEnd/>
+          </a:ln>
+        </p:spPr>
+        <p:txBody>
+          <a:bodyPr>
+            <a:prstTxWarp prst="textNoShape">
+              <a:avLst/>
+            </a:prstTxWarp>
+          </a:bodyPr>
+          <a:lstStyle/>
+          <a:p>
+            <a:endParaRPr lang="en-US"/>
+          </a:p>
+        </p:txBody>
+      </p:sp>
+    </p:spTree>
+  </p:cSld>
+  <p:clrMapOvr>
+    <a:masterClrMapping/>
+  </p:clrMapOvr>
+</p:notes>
+</file>
+
+<file path=ppt/notesSlides/notesSlide3.xml><?xml version="1.0" encoding="utf-8"?>
 <p:notes xmlns:a="http://schemas.openxmlformats.org/drawingml/2006/main" xmlns:r="http://schemas.openxmlformats.org/officeDocument/2006/relationships" xmlns:mc="http://schemas.openxmlformats.org/markup-compatibility/2006" xmlns:mv="urn:schemas-microsoft-com:mac:vml" xmlns:p="http://schemas.openxmlformats.org/presentationml/2006/main" mc:Ignorable="mv" mc:PreserveAttributes="mv:*">
   <p:cSld>
     <p:spTree>
@@ -3925,6 +4123,422 @@
           </a:ln>
           <a:effectLst/>
         </p:spPr>
+      </p:sp>
+    </p:spTree>
+  </p:cSld>
+  <p:clrMapOvr>
+    <a:masterClrMapping/>
+  </p:clrMapOvr>
+  <p:transition/>
+  <p:timing>
+    <p:tnLst>
+      <p:par>
+        <p:cTn id="2" dur="indefinite" restart="never" nodeType="tmRoot">
+          <p:childTnLst>
+            <p:seq concurrent="1" nextAc="seek">
+              <p:cTn id="3" dur="indefinite" nodeType="mainSeq">
+                <p:childTnLst>
+                  <p:par>
+                    <p:cTn id="4" fill="hold">
+                      <p:stCondLst>
+                        <p:cond delay="indefinite"/>
+                      </p:stCondLst>
+                      <p:childTnLst>
+                        <p:par>
+                          <p:cTn id="5" fill="hold">
+                            <p:stCondLst>
+                              <p:cond delay="0"/>
+                            </p:stCondLst>
+                            <p:childTnLst>
+                              <p:par>
+                                <p:cTn id="6" presetID="1" presetClass="entr" presetSubtype="0" fill="hold" grpId="1" nodeType="clickEffect">
+                                  <p:stCondLst>
+                                    <p:cond delay="0"/>
+                                  </p:stCondLst>
+                                  <p:childTnLst>
+                                    <p:set>
+                                      <p:cBhvr>
+                                        <p:cTn id="7" dur="1" fill="hold">
+                                          <p:stCondLst>
+                                            <p:cond delay="0"/>
+                                          </p:stCondLst>
+                                        </p:cTn>
+                                        <p:tgtEl>
+                                          <p:spTgt spid="2"/>
+                                        </p:tgtEl>
+                                        <p:attrNameLst>
+                                          <p:attrName>style.visibility</p:attrName>
+                                        </p:attrNameLst>
+                                      </p:cBhvr>
+                                      <p:to>
+                                        <p:strVal val="visible"/>
+                                      </p:to>
+                                    </p:set>
+                                  </p:childTnLst>
+                                </p:cTn>
+                              </p:par>
+                            </p:childTnLst>
+                          </p:cTn>
+                        </p:par>
+                      </p:childTnLst>
+                    </p:cTn>
+                  </p:par>
+                </p:childTnLst>
+              </p:cTn>
+              <p:prevCondLst>
+                <p:cond evt="onPrev" delay="0">
+                  <p:tgtEl>
+                    <p:sldTgt/>
+                  </p:tgtEl>
+                </p:cond>
+              </p:prevCondLst>
+              <p:nextCondLst>
+                <p:cond evt="onNext" delay="0">
+                  <p:tgtEl>
+                    <p:sldTgt/>
+                  </p:tgtEl>
+                </p:cond>
+              </p:nextCondLst>
+            </p:seq>
+          </p:childTnLst>
+        </p:cTn>
+      </p:par>
+    </p:tnLst>
+    <p:bldLst>
+      <p:bldP spid="2" grpId="2" animBg="1"/>
+    </p:bldLst>
+  </p:timing>
+</p:sld>
+</file>
+
+<file path=ppt/slides/slide2.xml><?xml version="1.0" encoding="utf-8"?>
+<p:sld xmlns:a="http://schemas.openxmlformats.org/drawingml/2006/main" xmlns:r="http://schemas.openxmlformats.org/officeDocument/2006/relationships" xmlns:mc="http://schemas.openxmlformats.org/markup-compatibility/2006" xmlns:mv="urn:schemas-microsoft-com:mac:vml" xmlns:p="http://schemas.openxmlformats.org/presentationml/2006/main" mc:Ignorable="mv" mc:PreserveAttributes="mv:*">
+  <p:cSld>
+    <p:spTree>
+      <p:nvGrpSpPr>
+        <p:cNvPr id="1" name="title"/>
+        <p:cNvGrpSpPr/>
+        <p:nvPr/>
+      </p:nvGrpSpPr>
+      <p:grpSpPr>
+        <a:xfrm>
+          <a:off x="0" y="0"/>
+          <a:ext cx="0" cy="0"/>
+          <a:chOff x="0" y="0"/>
+          <a:chExt cx="0" cy="0"/>
+        </a:xfrm>
+      </p:grpSpPr>
+      <p:sp>
+        <p:nvSpPr>
+          <p:cNvPr id="4" name="Title 1"/>
+          <p:cNvSpPr>
+            <a:spLocks noGrp="1"/>
+          </p:cNvSpPr>
+          <p:nvPr>
+            <p:ph type="title"/>
+          </p:nvPr>
+        </p:nvSpPr>
+        <p:spPr>
+          <a:xfrm>
+            <a:off x="0" y="0"/>
+            <a:ext cx="9164800" cy="1152000"/>
+          </a:xfrm>
+        </p:spPr>
+        <p:txBody>
+          <a:bodyPr/>
+          <a:lstStyle/>
+          <a:p>
+            <a:r>
+              <a:rPr lang="en-US" sz="4000" dirty="0" smtClean="0">
+                <a:solidFill>
+                  <a:srgbClr val="FF0000"/>
+                </a:solidFill>
+                <a:latin typeface="Times New Roman"/>
+                <a:cs typeface="Times New Roman"/>
+              </a:rPr>
+              <a:t>PPRectTest</a:t>
+            </a:r>
+            <a:endParaRPr lang="en-US" sz="4000" dirty="0">
+              <a:solidFill>
+                <a:srgbClr val="FF0000"/>
+              </a:solidFill>
+              <a:latin typeface="Times New Roman"/>
+              <a:cs typeface="Times New Roman"/>
+            </a:endParaRPr>
+          </a:p>
+        </p:txBody>
+      </p:sp>
+      <p:sp>
+        <p:nvSpPr>
+          <p:cNvPr id="5" name="PPRect#5"/>
+          <p:cNvSpPr/>
+          <p:nvPr/>
+        </p:nvSpPr>
+        <p:spPr bwMode="auto">
+          <a:xfrm>
+            <a:off x="2560000" y="1280000"/>
+            <a:ext cx="1280000" cy="1280000"/>
+          </a:xfrm>
+          <a:prstGeom prst="rect">
+            <a:avLst/>
+          </a:prstGeom>
+          <a:solidFill>
+            <a:srgbClr val="FF0000"/>
+          </a:solidFill>
+          <a:ln w="12800" cap="flat" cmpd="sng" algn="ctr">
+            <a:solidFill>
+              <a:srgbClr val="FF0000"/>
+            </a:solidFill>
+            <a:prstDash val="solid"/>
+            <a:round/>
+            <a:headEnd/>
+            <a:tailEnd/>
+          </a:ln>
+          <a:effectLst/>
+        </p:spPr>
+        <p:txBody>
+          <a:bodyPr vert="horz" wrap="square" lIns="0" tIns="0" rIns="0" bIns="0" anchor="ctr" anchorCtr="0" numCol="1" rtlCol="0" compatLnSpc="1">
+            <a:prstTxWarp prst="textNoShape">
+              <a:avLst/>
+            </a:prstTxWarp>
+          </a:bodyPr>
+          <a:lstStyle/>
+          <a:p>
+            <a:pPr marL="0" marR="0" indent="0" algn="ctr" defTabSz="914400" rtl="0" eaLnBrk="0" fontAlgn="base" latinLnBrk="0" hangingPunct="0">
+              <a:lnSpc>
+                <a:spcPct val="100000"/>
+              </a:lnSpc>
+              <a:spcBef>
+                <a:spcPct val="0"/>
+              </a:spcBef>
+              <a:spcAft>
+                <a:spcPct val="0"/>
+              </a:spcAft>
+              <a:buClrTx/>
+              <a:buSzTx/>
+              <a:buFontTx/>
+              <a:buNone/>
+              <a:tabLst/>
+            </a:pPr>
+            <a:r>
+              <a:rPr kumimoji="0" lang="en-US" sz="2400" b="0" i="0" u="none" strike="noStrike" cap="none" normalizeH="0" baseline="0" smtClean="0">
+                <a:ln>
+                  <a:noFill/>
+                </a:ln>
+                <a:solidFill>
+                  <a:schemeClr val="tx1"/>
+                </a:solidFill>
+                <a:effectLst/>
+                <a:latin typeface="Times New Roman" pitchFamily="84" charset="0"/>
+              </a:rPr>
+              <a:t/>
+            </a:r>
+          </a:p>
+        </p:txBody>
+      </p:sp>
+    </p:spTree>
+  </p:cSld>
+  <p:clrMapOvr>
+    <a:masterClrMapping/>
+  </p:clrMapOvr>
+  <p:transition/>
+  <p:timing>
+    <p:tnLst>
+      <p:par>
+        <p:cTn id="2" dur="indefinite" restart="never" nodeType="tmRoot">
+          <p:childTnLst>
+            <p:seq concurrent="1" nextAc="seek">
+              <p:cTn id="3" dur="indefinite" nodeType="mainSeq">
+                <p:childTnLst>
+                  <p:par>
+                    <p:cTn id="4" fill="hold">
+                      <p:stCondLst>
+                        <p:cond delay="indefinite"/>
+                      </p:stCondLst>
+                      <p:childTnLst>
+                        <p:par>
+                          <p:cTn id="5" fill="hold">
+                            <p:stCondLst>
+                              <p:cond delay="0"/>
+                            </p:stCondLst>
+                            <p:childTnLst>
+                              <p:par>
+                                <p:cTn id="6" presetID="1" presetClass="entr" presetSubtype="0" fill="hold" grpId="1" nodeType="clickEffect">
+                                  <p:stCondLst>
+                                    <p:cond delay="0"/>
+                                  </p:stCondLst>
+                                  <p:childTnLst>
+                                    <p:set>
+                                      <p:cBhvr>
+                                        <p:cTn id="7" dur="1" fill="hold">
+                                          <p:stCondLst>
+                                            <p:cond delay="0"/>
+                                          </p:stCondLst>
+                                        </p:cTn>
+                                        <p:tgtEl>
+                                          <p:spTgt spid="5"/>
+                                        </p:tgtEl>
+                                        <p:attrNameLst>
+                                          <p:attrName>style.visibility</p:attrName>
+                                        </p:attrNameLst>
+                                      </p:cBhvr>
+                                      <p:to>
+                                        <p:strVal val="visible"/>
+                                      </p:to>
+                                    </p:set>
+                                  </p:childTnLst>
+                                </p:cTn>
+                              </p:par>
+                            </p:childTnLst>
+                          </p:cTn>
+                        </p:par>
+                      </p:childTnLst>
+                    </p:cTn>
+                  </p:par>
+                </p:childTnLst>
+              </p:cTn>
+              <p:prevCondLst>
+                <p:cond evt="onPrev" delay="0">
+                  <p:tgtEl>
+                    <p:sldTgt/>
+                  </p:tgtEl>
+                </p:cond>
+              </p:prevCondLst>
+              <p:nextCondLst>
+                <p:cond evt="onNext" delay="0">
+                  <p:tgtEl>
+                    <p:sldTgt/>
+                  </p:tgtEl>
+                </p:cond>
+              </p:nextCondLst>
+            </p:seq>
+          </p:childTnLst>
+        </p:cTn>
+      </p:par>
+    </p:tnLst>
+    <p:bldLst>
+      <p:bldP spid="5" grpId="2" animBg="1"/>
+    </p:bldLst>
+  </p:timing>
+</p:sld>
+</file>
+
+<file path=ppt/slides/slide3.xml><?xml version="1.0" encoding="utf-8"?>
+<p:sld xmlns:a="http://schemas.openxmlformats.org/drawingml/2006/main" xmlns:r="http://schemas.openxmlformats.org/officeDocument/2006/relationships" xmlns:mc="http://schemas.openxmlformats.org/markup-compatibility/2006" xmlns:mv="urn:schemas-microsoft-com:mac:vml" xmlns:p="http://schemas.openxmlformats.org/presentationml/2006/main" mc:Ignorable="mv" mc:PreserveAttributes="mv:*">
+  <p:cSld>
+    <p:spTree>
+      <p:nvGrpSpPr>
+        <p:cNvPr id="1" name="title"/>
+        <p:cNvGrpSpPr/>
+        <p:nvPr/>
+      </p:nvGrpSpPr>
+      <p:grpSpPr>
+        <a:xfrm>
+          <a:off x="0" y="0"/>
+          <a:ext cx="0" cy="0"/>
+          <a:chOff x="0" y="0"/>
+          <a:chExt cx="0" cy="0"/>
+        </a:xfrm>
+      </p:grpSpPr>
+      <p:sp>
+        <p:nvSpPr>
+          <p:cNvPr id="6" name="Title 1"/>
+          <p:cNvSpPr>
+            <a:spLocks noGrp="1"/>
+          </p:cNvSpPr>
+          <p:nvPr>
+            <p:ph type="title"/>
+          </p:nvPr>
+        </p:nvSpPr>
+        <p:spPr>
+          <a:xfrm>
+            <a:off x="0" y="0"/>
+            <a:ext cx="9164800" cy="1152000"/>
+          </a:xfrm>
+        </p:spPr>
+        <p:txBody>
+          <a:bodyPr/>
+          <a:lstStyle/>
+          <a:p>
+            <a:r>
+              <a:rPr lang="en-US" sz="4000" dirty="0" smtClean="0">
+                <a:solidFill>
+                  <a:srgbClr val="FF0000"/>
+                </a:solidFill>
+                <a:latin typeface="Times New Roman"/>
+                <a:cs typeface="Times New Roman"/>
+              </a:rPr>
+              <a:t>PPTextBoxTest</a:t>
+            </a:r>
+            <a:endParaRPr lang="en-US" sz="4000" dirty="0">
+              <a:solidFill>
+                <a:srgbClr val="FF0000"/>
+              </a:solidFill>
+              <a:latin typeface="Times New Roman"/>
+              <a:cs typeface="Times New Roman"/>
+            </a:endParaRPr>
+          </a:p>
+        </p:txBody>
+      </p:sp>
+      <p:sp>
+        <p:nvSpPr>
+          <p:cNvPr id="7" name="PPTextBox#7"/>
+          <p:cNvSpPr/>
+          <p:nvPr/>
+        </p:nvSpPr>
+        <p:spPr bwMode="auto">
+          <a:xfrm>
+            <a:off x="3264000" y="3200000"/>
+            <a:ext cx="2636800" cy="473600"/>
+          </a:xfrm>
+          <a:prstGeom prst="rect">
+            <a:avLst/>
+          </a:prstGeom>
+          <a:noFill/>
+          <a:ln>
+            <a:noFill/>
+          </a:ln>
+          <a:effectLst/>
+        </p:spPr>
+        <p:txBody>
+          <a:bodyPr vert="horz" wrap="square" lIns="0" tIns="0" rIns="0" bIns="0" anchor="t" anchorCtr="0" numCol="1" rtlCol="0" compatLnSpc="1">
+            <a:prstTxWarp prst="textNoShape">
+              <a:avLst/>
+            </a:prstTxWarp>
+          </a:bodyPr>
+          <a:lstStyle/>
+          <a:p>
+            <a:pPr marL="0" marR="0" indent="0" algn="l" defTabSz="914400" rtl="0" eaLnBrk="0" fontAlgn="base" latinLnBrk="0" hangingPunct="0">
+              <a:lnSpc>
+                <a:spcPct val="100000"/>
+              </a:lnSpc>
+              <a:spcBef>
+                <a:spcPct val="0"/>
+              </a:spcBef>
+              <a:spcAft>
+                <a:spcPct val="0"/>
+              </a:spcAft>
+              <a:buClrTx/>
+              <a:buSzTx/>
+              <a:buFontTx/>
+              <a:buNone/>
+              <a:tabLst/>
+            </a:pPr>
+            <a:r>
+              <a:rPr kumimoji="0" lang="en-US" sz="3600" b="1" i="0" u="none" strike="noStrike" cap="none" normalizeH="0" baseline="0" smtClean="0">
+                <a:ln>
+                  <a:noFill/>
+                </a:ln>
+                <a:solidFill>
+                  <a:schemeClr val="tx1"/>
+                </a:solidFill>
+                <a:effectLst/>
+                <a:latin typeface="Helvetica" pitchFamily="84" charset="0"/>
+              </a:rPr>
+              <a:t>hello, world</a:t>
+            </a:r>
+          </a:p>
+        </p:txBody>
       </p:sp>
     </p:spTree>
   </p:cSld>

</xml_diff>

<commit_message>
Linear motion added to text and oval
</commit_message>
<xml_diff>
--- a/test/bin/PPSimpleExamples.pptx
+++ b/test/bin/PPSimpleExamples.pptx
@@ -9,11 +9,6 @@
   </p:notesMasterIdLst>
   <p:sldIdLst>
     <p:sldId id="517" r:id="rId101"/>
-    <p:sldId id="518" r:id="rId102"/>
-    <p:sldId id="519" r:id="rId103"/>
-    <p:sldId id="520" r:id="rId104"/>
-    <p:sldId id="521" r:id="rId105"/>
-    <p:sldId id="522" r:id="rId106"/>
   </p:sldIdLst>
   <p:sldSz cx="9144000" cy="6858000" type="screen4x3"/>
   <p:notesSz cx="9144000" cy="6858000"/>
@@ -584,496 +579,6 @@
 </file>
 
 <file path=ppt/notesSlides/notesSlide1.xml><?xml version="1.0" encoding="utf-8"?>
-<p:notes xmlns:a="http://schemas.openxmlformats.org/drawingml/2006/main" xmlns:r="http://schemas.openxmlformats.org/officeDocument/2006/relationships" xmlns:mc="http://schemas.openxmlformats.org/markup-compatibility/2006" xmlns:mv="urn:schemas-microsoft-com:mac:vml" xmlns:p="http://schemas.openxmlformats.org/presentationml/2006/main" mc:Ignorable="mv" mc:PreserveAttributes="mv:*">
-  <p:cSld>
-    <p:spTree>
-      <p:nvGrpSpPr>
-        <p:cNvPr id="0" name="title"/>
-        <p:cNvGrpSpPr/>
-        <p:nvPr/>
-      </p:nvGrpSpPr>
-      <p:grpSpPr>
-        <a:xfrm>
-          <a:off x="0" y="0"/>
-          <a:ext cx="0" cy="0"/>
-          <a:chOff x="0" y="0"/>
-          <a:chExt cx="0" cy="0"/>
-        </a:xfrm>
-      </p:grpSpPr>
-      <p:sp>
-        <p:nvSpPr>
-          <p:cNvPr id="135170" name="Rectangle 2"/>
-          <p:cNvSpPr>
-            <a:spLocks noGrp="1" noRot="1" noChangeAspect="1" noChangeArrowheads="1"/>
-          </p:cNvSpPr>
-          <p:nvPr>
-            <p:ph type="sldImg"/>
-          </p:nvPr>
-        </p:nvSpPr>
-        <p:spPr bwMode="auto">
-          <a:xfrm>
-            <a:off x="2844800" y="533400"/>
-            <a:ext cx="3454400" cy="2590800"/>
-          </a:xfrm>
-          <a:prstGeom prst="rect">
-            <a:avLst/>
-          </a:prstGeom>
-          <a:solidFill>
-            <a:srgbClr val="FFFFFF"/>
-          </a:solidFill>
-          <a:ln>
-            <a:solidFill>
-              <a:srgbClr val="000000"/>
-            </a:solidFill>
-            <a:miter lim="800000"/>
-            <a:headEnd/>
-            <a:tailEnd/>
-          </a:ln>
-        </p:spPr>
-      </p:sp>
-      <p:sp>
-        <p:nvSpPr>
-          <p:cNvPr id="135171" name="Rectangle 3"/>
-          <p:cNvSpPr>
-            <a:spLocks noGrp="1" noChangeArrowheads="1"/>
-          </p:cNvSpPr>
-          <p:nvPr>
-            <p:ph type="body" idx="1"/>
-          </p:nvPr>
-        </p:nvSpPr>
-        <p:spPr bwMode="auto">
-          <a:xfrm>
-            <a:off x="1219200" y="3276600"/>
-            <a:ext cx="6705600" cy="3048000"/>
-          </a:xfrm>
-          <a:prstGeom prst="rect">
-            <a:avLst/>
-          </a:prstGeom>
-          <a:solidFill>
-            <a:srgbClr val="FFFFFF"/>
-          </a:solidFill>
-          <a:ln>
-            <a:solidFill>
-              <a:srgbClr val="000000"/>
-            </a:solidFill>
-            <a:miter lim="800000"/>
-            <a:headEnd/>
-            <a:tailEnd/>
-          </a:ln>
-        </p:spPr>
-        <p:txBody>
-          <a:bodyPr>
-            <a:prstTxWarp prst="textNoShape">
-              <a:avLst/>
-            </a:prstTxWarp>
-          </a:bodyPr>
-          <a:lstStyle/>
-          <a:p>
-            <a:endParaRPr lang="en-US"/>
-          </a:p>
-        </p:txBody>
-      </p:sp>
-    </p:spTree>
-  </p:cSld>
-  <p:clrMapOvr>
-    <a:masterClrMapping/>
-  </p:clrMapOvr>
-</p:notes>
-</file>
-
-<file path=ppt/notesSlides/notesSlide2.xml><?xml version="1.0" encoding="utf-8"?>
-<p:notes xmlns:a="http://schemas.openxmlformats.org/drawingml/2006/main" xmlns:r="http://schemas.openxmlformats.org/officeDocument/2006/relationships" xmlns:mc="http://schemas.openxmlformats.org/markup-compatibility/2006" xmlns:mv="urn:schemas-microsoft-com:mac:vml" xmlns:p="http://schemas.openxmlformats.org/presentationml/2006/main" mc:Ignorable="mv" mc:PreserveAttributes="mv:*">
-  <p:cSld>
-    <p:spTree>
-      <p:nvGrpSpPr>
-        <p:cNvPr id="0" name="title"/>
-        <p:cNvGrpSpPr/>
-        <p:nvPr/>
-      </p:nvGrpSpPr>
-      <p:grpSpPr>
-        <a:xfrm>
-          <a:off x="0" y="0"/>
-          <a:ext cx="0" cy="0"/>
-          <a:chOff x="0" y="0"/>
-          <a:chExt cx="0" cy="0"/>
-        </a:xfrm>
-      </p:grpSpPr>
-      <p:sp>
-        <p:nvSpPr>
-          <p:cNvPr id="135170" name="Rectangle 2"/>
-          <p:cNvSpPr>
-            <a:spLocks noGrp="1" noRot="1" noChangeAspect="1" noChangeArrowheads="1"/>
-          </p:cNvSpPr>
-          <p:nvPr>
-            <p:ph type="sldImg"/>
-          </p:nvPr>
-        </p:nvSpPr>
-        <p:spPr bwMode="auto">
-          <a:xfrm>
-            <a:off x="2844800" y="533400"/>
-            <a:ext cx="3454400" cy="2590800"/>
-          </a:xfrm>
-          <a:prstGeom prst="rect">
-            <a:avLst/>
-          </a:prstGeom>
-          <a:solidFill>
-            <a:srgbClr val="FFFFFF"/>
-          </a:solidFill>
-          <a:ln>
-            <a:solidFill>
-              <a:srgbClr val="000000"/>
-            </a:solidFill>
-            <a:miter lim="800000"/>
-            <a:headEnd/>
-            <a:tailEnd/>
-          </a:ln>
-        </p:spPr>
-      </p:sp>
-      <p:sp>
-        <p:nvSpPr>
-          <p:cNvPr id="135171" name="Rectangle 3"/>
-          <p:cNvSpPr>
-            <a:spLocks noGrp="1" noChangeArrowheads="1"/>
-          </p:cNvSpPr>
-          <p:nvPr>
-            <p:ph type="body" idx="1"/>
-          </p:nvPr>
-        </p:nvSpPr>
-        <p:spPr bwMode="auto">
-          <a:xfrm>
-            <a:off x="1219200" y="3276600"/>
-            <a:ext cx="6705600" cy="3048000"/>
-          </a:xfrm>
-          <a:prstGeom prst="rect">
-            <a:avLst/>
-          </a:prstGeom>
-          <a:solidFill>
-            <a:srgbClr val="FFFFFF"/>
-          </a:solidFill>
-          <a:ln>
-            <a:solidFill>
-              <a:srgbClr val="000000"/>
-            </a:solidFill>
-            <a:miter lim="800000"/>
-            <a:headEnd/>
-            <a:tailEnd/>
-          </a:ln>
-        </p:spPr>
-        <p:txBody>
-          <a:bodyPr>
-            <a:prstTxWarp prst="textNoShape">
-              <a:avLst/>
-            </a:prstTxWarp>
-          </a:bodyPr>
-          <a:lstStyle/>
-          <a:p>
-            <a:endParaRPr lang="en-US"/>
-          </a:p>
-        </p:txBody>
-      </p:sp>
-    </p:spTree>
-  </p:cSld>
-  <p:clrMapOvr>
-    <a:masterClrMapping/>
-  </p:clrMapOvr>
-</p:notes>
-</file>
-
-<file path=ppt/notesSlides/notesSlide3.xml><?xml version="1.0" encoding="utf-8"?>
-<p:notes xmlns:a="http://schemas.openxmlformats.org/drawingml/2006/main" xmlns:r="http://schemas.openxmlformats.org/officeDocument/2006/relationships" xmlns:mc="http://schemas.openxmlformats.org/markup-compatibility/2006" xmlns:mv="urn:schemas-microsoft-com:mac:vml" xmlns:p="http://schemas.openxmlformats.org/presentationml/2006/main" mc:Ignorable="mv" mc:PreserveAttributes="mv:*">
-  <p:cSld>
-    <p:spTree>
-      <p:nvGrpSpPr>
-        <p:cNvPr id="0" name="title"/>
-        <p:cNvGrpSpPr/>
-        <p:nvPr/>
-      </p:nvGrpSpPr>
-      <p:grpSpPr>
-        <a:xfrm>
-          <a:off x="0" y="0"/>
-          <a:ext cx="0" cy="0"/>
-          <a:chOff x="0" y="0"/>
-          <a:chExt cx="0" cy="0"/>
-        </a:xfrm>
-      </p:grpSpPr>
-      <p:sp>
-        <p:nvSpPr>
-          <p:cNvPr id="135170" name="Rectangle 2"/>
-          <p:cNvSpPr>
-            <a:spLocks noGrp="1" noRot="1" noChangeAspect="1" noChangeArrowheads="1"/>
-          </p:cNvSpPr>
-          <p:nvPr>
-            <p:ph type="sldImg"/>
-          </p:nvPr>
-        </p:nvSpPr>
-        <p:spPr bwMode="auto">
-          <a:xfrm>
-            <a:off x="2844800" y="533400"/>
-            <a:ext cx="3454400" cy="2590800"/>
-          </a:xfrm>
-          <a:prstGeom prst="rect">
-            <a:avLst/>
-          </a:prstGeom>
-          <a:solidFill>
-            <a:srgbClr val="FFFFFF"/>
-          </a:solidFill>
-          <a:ln>
-            <a:solidFill>
-              <a:srgbClr val="000000"/>
-            </a:solidFill>
-            <a:miter lim="800000"/>
-            <a:headEnd/>
-            <a:tailEnd/>
-          </a:ln>
-        </p:spPr>
-      </p:sp>
-      <p:sp>
-        <p:nvSpPr>
-          <p:cNvPr id="135171" name="Rectangle 3"/>
-          <p:cNvSpPr>
-            <a:spLocks noGrp="1" noChangeArrowheads="1"/>
-          </p:cNvSpPr>
-          <p:nvPr>
-            <p:ph type="body" idx="1"/>
-          </p:nvPr>
-        </p:nvSpPr>
-        <p:spPr bwMode="auto">
-          <a:xfrm>
-            <a:off x="1219200" y="3276600"/>
-            <a:ext cx="6705600" cy="3048000"/>
-          </a:xfrm>
-          <a:prstGeom prst="rect">
-            <a:avLst/>
-          </a:prstGeom>
-          <a:solidFill>
-            <a:srgbClr val="FFFFFF"/>
-          </a:solidFill>
-          <a:ln>
-            <a:solidFill>
-              <a:srgbClr val="000000"/>
-            </a:solidFill>
-            <a:miter lim="800000"/>
-            <a:headEnd/>
-            <a:tailEnd/>
-          </a:ln>
-        </p:spPr>
-        <p:txBody>
-          <a:bodyPr>
-            <a:prstTxWarp prst="textNoShape">
-              <a:avLst/>
-            </a:prstTxWarp>
-          </a:bodyPr>
-          <a:lstStyle/>
-          <a:p>
-            <a:endParaRPr lang="en-US"/>
-          </a:p>
-        </p:txBody>
-      </p:sp>
-    </p:spTree>
-  </p:cSld>
-  <p:clrMapOvr>
-    <a:masterClrMapping/>
-  </p:clrMapOvr>
-</p:notes>
-</file>
-
-<file path=ppt/notesSlides/notesSlide4.xml><?xml version="1.0" encoding="utf-8"?>
-<p:notes xmlns:a="http://schemas.openxmlformats.org/drawingml/2006/main" xmlns:r="http://schemas.openxmlformats.org/officeDocument/2006/relationships" xmlns:mc="http://schemas.openxmlformats.org/markup-compatibility/2006" xmlns:mv="urn:schemas-microsoft-com:mac:vml" xmlns:p="http://schemas.openxmlformats.org/presentationml/2006/main" mc:Ignorable="mv" mc:PreserveAttributes="mv:*">
-  <p:cSld>
-    <p:spTree>
-      <p:nvGrpSpPr>
-        <p:cNvPr id="0" name="title"/>
-        <p:cNvGrpSpPr/>
-        <p:nvPr/>
-      </p:nvGrpSpPr>
-      <p:grpSpPr>
-        <a:xfrm>
-          <a:off x="0" y="0"/>
-          <a:ext cx="0" cy="0"/>
-          <a:chOff x="0" y="0"/>
-          <a:chExt cx="0" cy="0"/>
-        </a:xfrm>
-      </p:grpSpPr>
-      <p:sp>
-        <p:nvSpPr>
-          <p:cNvPr id="135170" name="Rectangle 2"/>
-          <p:cNvSpPr>
-            <a:spLocks noGrp="1" noRot="1" noChangeAspect="1" noChangeArrowheads="1"/>
-          </p:cNvSpPr>
-          <p:nvPr>
-            <p:ph type="sldImg"/>
-          </p:nvPr>
-        </p:nvSpPr>
-        <p:spPr bwMode="auto">
-          <a:xfrm>
-            <a:off x="2844800" y="533400"/>
-            <a:ext cx="3454400" cy="2590800"/>
-          </a:xfrm>
-          <a:prstGeom prst="rect">
-            <a:avLst/>
-          </a:prstGeom>
-          <a:solidFill>
-            <a:srgbClr val="FFFFFF"/>
-          </a:solidFill>
-          <a:ln>
-            <a:solidFill>
-              <a:srgbClr val="000000"/>
-            </a:solidFill>
-            <a:miter lim="800000"/>
-            <a:headEnd/>
-            <a:tailEnd/>
-          </a:ln>
-        </p:spPr>
-      </p:sp>
-      <p:sp>
-        <p:nvSpPr>
-          <p:cNvPr id="135171" name="Rectangle 3"/>
-          <p:cNvSpPr>
-            <a:spLocks noGrp="1" noChangeArrowheads="1"/>
-          </p:cNvSpPr>
-          <p:nvPr>
-            <p:ph type="body" idx="1"/>
-          </p:nvPr>
-        </p:nvSpPr>
-        <p:spPr bwMode="auto">
-          <a:xfrm>
-            <a:off x="1219200" y="3276600"/>
-            <a:ext cx="6705600" cy="3048000"/>
-          </a:xfrm>
-          <a:prstGeom prst="rect">
-            <a:avLst/>
-          </a:prstGeom>
-          <a:solidFill>
-            <a:srgbClr val="FFFFFF"/>
-          </a:solidFill>
-          <a:ln>
-            <a:solidFill>
-              <a:srgbClr val="000000"/>
-            </a:solidFill>
-            <a:miter lim="800000"/>
-            <a:headEnd/>
-            <a:tailEnd/>
-          </a:ln>
-        </p:spPr>
-        <p:txBody>
-          <a:bodyPr>
-            <a:prstTxWarp prst="textNoShape">
-              <a:avLst/>
-            </a:prstTxWarp>
-          </a:bodyPr>
-          <a:lstStyle/>
-          <a:p>
-            <a:endParaRPr lang="en-US"/>
-          </a:p>
-        </p:txBody>
-      </p:sp>
-    </p:spTree>
-  </p:cSld>
-  <p:clrMapOvr>
-    <a:masterClrMapping/>
-  </p:clrMapOvr>
-</p:notes>
-</file>
-
-<file path=ppt/notesSlides/notesSlide5.xml><?xml version="1.0" encoding="utf-8"?>
-<p:notes xmlns:a="http://schemas.openxmlformats.org/drawingml/2006/main" xmlns:r="http://schemas.openxmlformats.org/officeDocument/2006/relationships" xmlns:mc="http://schemas.openxmlformats.org/markup-compatibility/2006" xmlns:mv="urn:schemas-microsoft-com:mac:vml" xmlns:p="http://schemas.openxmlformats.org/presentationml/2006/main" mc:Ignorable="mv" mc:PreserveAttributes="mv:*">
-  <p:cSld>
-    <p:spTree>
-      <p:nvGrpSpPr>
-        <p:cNvPr id="0" name="title"/>
-        <p:cNvGrpSpPr/>
-        <p:nvPr/>
-      </p:nvGrpSpPr>
-      <p:grpSpPr>
-        <a:xfrm>
-          <a:off x="0" y="0"/>
-          <a:ext cx="0" cy="0"/>
-          <a:chOff x="0" y="0"/>
-          <a:chExt cx="0" cy="0"/>
-        </a:xfrm>
-      </p:grpSpPr>
-      <p:sp>
-        <p:nvSpPr>
-          <p:cNvPr id="135170" name="Rectangle 2"/>
-          <p:cNvSpPr>
-            <a:spLocks noGrp="1" noRot="1" noChangeAspect="1" noChangeArrowheads="1"/>
-          </p:cNvSpPr>
-          <p:nvPr>
-            <p:ph type="sldImg"/>
-          </p:nvPr>
-        </p:nvSpPr>
-        <p:spPr bwMode="auto">
-          <a:xfrm>
-            <a:off x="2844800" y="533400"/>
-            <a:ext cx="3454400" cy="2590800"/>
-          </a:xfrm>
-          <a:prstGeom prst="rect">
-            <a:avLst/>
-          </a:prstGeom>
-          <a:solidFill>
-            <a:srgbClr val="FFFFFF"/>
-          </a:solidFill>
-          <a:ln>
-            <a:solidFill>
-              <a:srgbClr val="000000"/>
-            </a:solidFill>
-            <a:miter lim="800000"/>
-            <a:headEnd/>
-            <a:tailEnd/>
-          </a:ln>
-        </p:spPr>
-      </p:sp>
-      <p:sp>
-        <p:nvSpPr>
-          <p:cNvPr id="135171" name="Rectangle 3"/>
-          <p:cNvSpPr>
-            <a:spLocks noGrp="1" noChangeArrowheads="1"/>
-          </p:cNvSpPr>
-          <p:nvPr>
-            <p:ph type="body" idx="1"/>
-          </p:nvPr>
-        </p:nvSpPr>
-        <p:spPr bwMode="auto">
-          <a:xfrm>
-            <a:off x="1219200" y="3276600"/>
-            <a:ext cx="6705600" cy="3048000"/>
-          </a:xfrm>
-          <a:prstGeom prst="rect">
-            <a:avLst/>
-          </a:prstGeom>
-          <a:solidFill>
-            <a:srgbClr val="FFFFFF"/>
-          </a:solidFill>
-          <a:ln>
-            <a:solidFill>
-              <a:srgbClr val="000000"/>
-            </a:solidFill>
-            <a:miter lim="800000"/>
-            <a:headEnd/>
-            <a:tailEnd/>
-          </a:ln>
-        </p:spPr>
-        <p:txBody>
-          <a:bodyPr>
-            <a:prstTxWarp prst="textNoShape">
-              <a:avLst/>
-            </a:prstTxWarp>
-          </a:bodyPr>
-          <a:lstStyle/>
-          <a:p>
-            <a:endParaRPr lang="en-US"/>
-          </a:p>
-        </p:txBody>
-      </p:sp>
-    </p:spTree>
-  </p:cSld>
-  <p:clrMapOvr>
-    <a:masterClrMapping/>
-  </p:clrMapOvr>
-</p:notes>
-</file>
-
-<file path=ppt/notesSlides/notesSlide6.xml><?xml version="1.0" encoding="utf-8"?>
 <p:notes xmlns:a="http://schemas.openxmlformats.org/drawingml/2006/main" xmlns:r="http://schemas.openxmlformats.org/officeDocument/2006/relationships" xmlns:mc="http://schemas.openxmlformats.org/markup-compatibility/2006" xmlns:mv="urn:schemas-microsoft-com:mac:vml" xmlns:p="http://schemas.openxmlformats.org/presentationml/2006/main" mc:Ignorable="mv" mc:PreserveAttributes="mv:*">
   <p:cSld>
     <p:spTree>
@@ -4351,7 +3856,7 @@
                 <a:latin typeface="Times New Roman"/>
                 <a:cs typeface="Times New Roman"/>
               </a:rPr>
-              <a:t>Simple Shapes</a:t>
+              <a:t>Sorting</a:t>
             </a:r>
             <a:endParaRPr lang="en-US" sz="4000" dirty="0">
               <a:solidFill>
@@ -4365,41 +3870,33 @@
       </p:sp>
       <p:sp>
         <p:nvSpPr>
-          <p:cNvPr id="2" name="PPRect#2"/>
+          <p:cNvPr id="2" name="PPTextBox#2"/>
           <p:cNvSpPr/>
           <p:nvPr/>
         </p:nvSpPr>
         <p:spPr bwMode="auto">
           <a:xfrm>
-            <a:off x="3302400" y="2156800"/>
-            <a:ext cx="2560000" cy="2560000"/>
+            <a:off x="2560000" y="2560000"/>
+            <a:ext cx="179200" cy="371200"/>
           </a:xfrm>
           <a:prstGeom prst="rect">
             <a:avLst/>
           </a:prstGeom>
-          <a:solidFill>
-            <a:srgbClr val="FF0000"/>
-          </a:solidFill>
-          <a:ln w="12800" cap="flat" cmpd="sng" algn="ctr">
-            <a:solidFill>
-              <a:srgbClr val="FF0000"/>
-            </a:solidFill>
-            <a:prstDash val="solid"/>
-            <a:round/>
-            <a:headEnd/>
-            <a:tailEnd/>
+          <a:noFill/>
+          <a:ln>
+            <a:noFill/>
           </a:ln>
           <a:effectLst/>
         </p:spPr>
         <p:txBody>
-          <a:bodyPr vert="horz" wrap="square" lIns="0" tIns="0" rIns="0" bIns="0" anchor="ctr" anchorCtr="0" numCol="1" rtlCol="0" compatLnSpc="1">
+          <a:bodyPr vert="horz" wrap="square" lIns="0" tIns="0" rIns="0" bIns="0" anchor="t" anchorCtr="0" numCol="1" rtlCol="0" compatLnSpc="1">
             <a:prstTxWarp prst="textNoShape">
               <a:avLst/>
             </a:prstTxWarp>
           </a:bodyPr>
           <a:lstStyle/>
           <a:p>
-            <a:pPr marL="0" marR="0" indent="0" algn="ctr" defTabSz="914400" rtl="0" eaLnBrk="0" fontAlgn="base" latinLnBrk="0" hangingPunct="0">
+            <a:pPr marL="0" marR="0" indent="0" algn="l" defTabSz="914400" rtl="0" eaLnBrk="0" fontAlgn="base" latinLnBrk="0" hangingPunct="0">
               <a:lnSpc>
                 <a:spcPct val="100000"/>
               </a:lnSpc>
@@ -4426,48 +3923,40 @@
                 <a:effectLst/>
                 <a:latin typeface="Times New Roman" pitchFamily="84" charset="0"/>
               </a:rPr>
-              <a:t/>
-            </a:r>
-          </a:p>
-        </p:txBody>
-      </p:sp>
-      <p:sp>
-        <p:nvSpPr>
-          <p:cNvPr id="3" name="PPOval#3"/>
+              <a:t>5</a:t>
+            </a:r>
+          </a:p>
+        </p:txBody>
+      </p:sp>
+      <p:sp>
+        <p:nvSpPr>
+          <p:cNvPr id="3" name="PPTextBox#3"/>
           <p:cNvSpPr/>
           <p:nvPr/>
         </p:nvSpPr>
         <p:spPr bwMode="auto">
           <a:xfrm>
-            <a:off x="960000" y="960000"/>
-            <a:ext cx="2560000" cy="2560000"/>
+            <a:off x="2944000" y="2560000"/>
+            <a:ext cx="179200" cy="371200"/>
           </a:xfrm>
-          <a:prstGeom prst="ellipse">
+          <a:prstGeom prst="rect">
             <a:avLst/>
           </a:prstGeom>
-          <a:solidFill>
-            <a:srgbClr val="FF0000"/>
-          </a:solidFill>
-          <a:ln w="12800" cap="flat" cmpd="sng" algn="ctr">
-            <a:solidFill>
-              <a:srgbClr val="FF0000"/>
-            </a:solidFill>
-            <a:prstDash val="solid"/>
-            <a:round/>
-            <a:headEnd/>
-            <a:tailEnd/>
+          <a:noFill/>
+          <a:ln>
+            <a:noFill/>
           </a:ln>
           <a:effectLst/>
         </p:spPr>
         <p:txBody>
-          <a:bodyPr vert="horz" wrap="square" lIns="0" tIns="0" rIns="0" bIns="0" anchor="ctr" anchorCtr="0" numCol="1" rtlCol="0" compatLnSpc="1">
+          <a:bodyPr vert="horz" wrap="square" lIns="0" tIns="0" rIns="0" bIns="0" anchor="t" anchorCtr="0" numCol="1" rtlCol="0" compatLnSpc="1">
             <a:prstTxWarp prst="textNoShape">
               <a:avLst/>
             </a:prstTxWarp>
           </a:bodyPr>
           <a:lstStyle/>
           <a:p>
-            <a:pPr marL="0" marR="0" indent="0" algn="ctr" defTabSz="914400" rtl="0" eaLnBrk="0" fontAlgn="base" latinLnBrk="0" hangingPunct="0">
+            <a:pPr marL="0" marR="0" indent="0" algn="l" defTabSz="914400" rtl="0" eaLnBrk="0" fontAlgn="base" latinLnBrk="0" hangingPunct="0">
               <a:lnSpc>
                 <a:spcPct val="100000"/>
               </a:lnSpc>
@@ -4494,7 +3983,187 @@
                 <a:effectLst/>
                 <a:latin typeface="Times New Roman" pitchFamily="84" charset="0"/>
               </a:rPr>
-              <a:t/>
+              <a:t>4</a:t>
+            </a:r>
+          </a:p>
+        </p:txBody>
+      </p:sp>
+      <p:sp>
+        <p:nvSpPr>
+          <p:cNvPr id="4" name="PPTextBox#4"/>
+          <p:cNvSpPr/>
+          <p:nvPr/>
+        </p:nvSpPr>
+        <p:spPr bwMode="auto">
+          <a:xfrm>
+            <a:off x="3328000" y="2560000"/>
+            <a:ext cx="179200" cy="371200"/>
+          </a:xfrm>
+          <a:prstGeom prst="rect">
+            <a:avLst/>
+          </a:prstGeom>
+          <a:noFill/>
+          <a:ln>
+            <a:noFill/>
+          </a:ln>
+          <a:effectLst/>
+        </p:spPr>
+        <p:txBody>
+          <a:bodyPr vert="horz" wrap="square" lIns="0" tIns="0" rIns="0" bIns="0" anchor="t" anchorCtr="0" numCol="1" rtlCol="0" compatLnSpc="1">
+            <a:prstTxWarp prst="textNoShape">
+              <a:avLst/>
+            </a:prstTxWarp>
+          </a:bodyPr>
+          <a:lstStyle/>
+          <a:p>
+            <a:pPr marL="0" marR="0" indent="0" algn="l" defTabSz="914400" rtl="0" eaLnBrk="0" fontAlgn="base" latinLnBrk="0" hangingPunct="0">
+              <a:lnSpc>
+                <a:spcPct val="100000"/>
+              </a:lnSpc>
+              <a:spcBef>
+                <a:spcPct val="0"/>
+              </a:spcBef>
+              <a:spcAft>
+                <a:spcPct val="0"/>
+              </a:spcAft>
+              <a:buClrTx/>
+              <a:buSzTx/>
+              <a:buFontTx/>
+              <a:buNone/>
+              <a:tabLst/>
+            </a:pPr>
+            <a:r>
+              <a:rPr kumimoji="0" lang="en-US" sz="2400" b="0" i="0" u="none" strike="noStrike" cap="none" normalizeH="0" baseline="0" smtClean="0">
+                <a:ln>
+                  <a:noFill/>
+                </a:ln>
+                <a:solidFill>
+                  <a:schemeClr val="tx1"/>
+                </a:solidFill>
+                <a:effectLst/>
+                <a:latin typeface="Times New Roman" pitchFamily="84" charset="0"/>
+              </a:rPr>
+              <a:t>3</a:t>
+            </a:r>
+          </a:p>
+        </p:txBody>
+      </p:sp>
+      <p:sp>
+        <p:nvSpPr>
+          <p:cNvPr id="5" name="PPTextBox#5"/>
+          <p:cNvSpPr/>
+          <p:nvPr/>
+        </p:nvSpPr>
+        <p:spPr bwMode="auto">
+          <a:xfrm>
+            <a:off x="3712000" y="2560000"/>
+            <a:ext cx="179200" cy="371200"/>
+          </a:xfrm>
+          <a:prstGeom prst="rect">
+            <a:avLst/>
+          </a:prstGeom>
+          <a:noFill/>
+          <a:ln>
+            <a:noFill/>
+          </a:ln>
+          <a:effectLst/>
+        </p:spPr>
+        <p:txBody>
+          <a:bodyPr vert="horz" wrap="square" lIns="0" tIns="0" rIns="0" bIns="0" anchor="t" anchorCtr="0" numCol="1" rtlCol="0" compatLnSpc="1">
+            <a:prstTxWarp prst="textNoShape">
+              <a:avLst/>
+            </a:prstTxWarp>
+          </a:bodyPr>
+          <a:lstStyle/>
+          <a:p>
+            <a:pPr marL="0" marR="0" indent="0" algn="l" defTabSz="914400" rtl="0" eaLnBrk="0" fontAlgn="base" latinLnBrk="0" hangingPunct="0">
+              <a:lnSpc>
+                <a:spcPct val="100000"/>
+              </a:lnSpc>
+              <a:spcBef>
+                <a:spcPct val="0"/>
+              </a:spcBef>
+              <a:spcAft>
+                <a:spcPct val="0"/>
+              </a:spcAft>
+              <a:buClrTx/>
+              <a:buSzTx/>
+              <a:buFontTx/>
+              <a:buNone/>
+              <a:tabLst/>
+            </a:pPr>
+            <a:r>
+              <a:rPr kumimoji="0" lang="en-US" sz="2400" b="0" i="0" u="none" strike="noStrike" cap="none" normalizeH="0" baseline="0" smtClean="0">
+                <a:ln>
+                  <a:noFill/>
+                </a:ln>
+                <a:solidFill>
+                  <a:schemeClr val="tx1"/>
+                </a:solidFill>
+                <a:effectLst/>
+                <a:latin typeface="Times New Roman" pitchFamily="84" charset="0"/>
+              </a:rPr>
+              <a:t>2</a:t>
+            </a:r>
+          </a:p>
+        </p:txBody>
+      </p:sp>
+      <p:sp>
+        <p:nvSpPr>
+          <p:cNvPr id="6" name="PPTextBox#6"/>
+          <p:cNvSpPr/>
+          <p:nvPr/>
+        </p:nvSpPr>
+        <p:spPr bwMode="auto">
+          <a:xfrm>
+            <a:off x="4096000" y="2560000"/>
+            <a:ext cx="179200" cy="371200"/>
+          </a:xfrm>
+          <a:prstGeom prst="rect">
+            <a:avLst/>
+          </a:prstGeom>
+          <a:noFill/>
+          <a:ln>
+            <a:noFill/>
+          </a:ln>
+          <a:effectLst/>
+        </p:spPr>
+        <p:txBody>
+          <a:bodyPr vert="horz" wrap="square" lIns="0" tIns="0" rIns="0" bIns="0" anchor="t" anchorCtr="0" numCol="1" rtlCol="0" compatLnSpc="1">
+            <a:prstTxWarp prst="textNoShape">
+              <a:avLst/>
+            </a:prstTxWarp>
+          </a:bodyPr>
+          <a:lstStyle/>
+          <a:p>
+            <a:pPr marL="0" marR="0" indent="0" algn="l" defTabSz="914400" rtl="0" eaLnBrk="0" fontAlgn="base" latinLnBrk="0" hangingPunct="0">
+              <a:lnSpc>
+                <a:spcPct val="100000"/>
+              </a:lnSpc>
+              <a:spcBef>
+                <a:spcPct val="0"/>
+              </a:spcBef>
+              <a:spcAft>
+                <a:spcPct val="0"/>
+              </a:spcAft>
+              <a:buClrTx/>
+              <a:buSzTx/>
+              <a:buFontTx/>
+              <a:buNone/>
+              <a:tabLst/>
+            </a:pPr>
+            <a:r>
+              <a:rPr kumimoji="0" lang="en-US" sz="2400" b="0" i="0" u="none" strike="noStrike" cap="none" normalizeH="0" baseline="0" smtClean="0">
+                <a:ln>
+                  <a:noFill/>
+                </a:ln>
+                <a:solidFill>
+                  <a:schemeClr val="tx1"/>
+                </a:solidFill>
+                <a:effectLst/>
+                <a:latin typeface="Times New Roman" pitchFamily="84" charset="0"/>
+              </a:rPr>
+              <a:t>1</a:t>
             </a:r>
           </a:p>
         </p:txBody>
@@ -4526,14 +4195,14 @@
                             </p:stCondLst>
                             <p:childTnLst>
                               <p:par>
-                                <p:cTn id="6" presetID="1" presetClass="exit" presetSubtype="0" fill="hold" grpId="1" nodeType="clickEffect">
+                                <p:cTn id="6" presetID="0" presetClass="path" presetSubtype="0" accel="0" decel="0" fill="hold" grpId="1" nodeType="clickEffect">
                                   <p:stCondLst>
                                     <p:cond delay="0"/>
                                   </p:stCondLst>
                                   <p:childTnLst>
-                                    <p:set>
+                                    <p:animMotion origin="layout" path="M 0.000 0.000 L 0.168 0.000 " pathEditMode="relative" ptsTypes="AA">
                                       <p:cBhvr>
-                                        <p:cTn id="7" dur="1" fill="hold">
+                                        <p:cTn id="7" dur="1200" fill="hold">
                                           <p:stCondLst>
                                             <p:cond delay="0"/>
                                           </p:stCondLst>
@@ -4542,13 +4211,11 @@
                                           <p:spTgt spid="2"/>
                                         </p:tgtEl>
                                         <p:attrNameLst>
-                                          <p:attrName>style.visibility</p:attrName>
+                                          <p:attrName>ppt_x</p:attrName>
+                                          <p:attrName>ppt_y</p:attrName>
                                         </p:attrNameLst>
                                       </p:cBhvr>
-                                      <p:to>
-                                        <p:strVal val="hidden"/>
-                                      </p:to>
-                                    </p:set>
+                                    </p:animMotion>
                                   </p:childTnLst>
                                 </p:cTn>
                               </p:par>
@@ -4571,1527 +4238,20 @@
                             </p:stCondLst>
                             <p:childTnLst>
                               <p:par>
-                                <p:cTn id="10" presetID="1" presetClass="entr" presetSubtype="0" fill="hold" grpId="2" nodeType="clickEffect">
+                                <p:cTn id="10" presetID="0" presetClass="path" presetSubtype="0" accel="0" decel="0" fill="hold" grpId="2" nodeType="clickEffect">
                                   <p:stCondLst>
                                     <p:cond delay="0"/>
                                   </p:stCondLst>
                                   <p:childTnLst>
-                                    <p:set>
+                                    <p:animMotion origin="layout" path="M 0.000 0.000 L -0.168 0.000 " pathEditMode="relative" ptsTypes="AA">
                                       <p:cBhvr>
-                                        <p:cTn id="11" dur="1" fill="hold">
+                                        <p:cTn id="11" dur="1200" fill="hold">
                                           <p:stCondLst>
                                             <p:cond delay="0"/>
                                           </p:stCondLst>
                                         </p:cTn>
                                         <p:tgtEl>
-                                          <p:spTgt spid="3"/>
-                                        </p:tgtEl>
-                                        <p:attrNameLst>
-                                          <p:attrName>style.visibility</p:attrName>
-                                        </p:attrNameLst>
-                                      </p:cBhvr>
-                                      <p:to>
-                                        <p:strVal val="visible"/>
-                                      </p:to>
-                                    </p:set>
-                                  </p:childTnLst>
-                                </p:cTn>
-                              </p:par>
-                            </p:childTnLst>
-                          </p:cTn>
-                        </p:par>
-                      </p:childTnLst>
-                    </p:cTn>
-                  </p:par>
-                </p:childTnLst>
-              </p:cTn>
-              <p:prevCondLst>
-                <p:cond evt="onPrev" delay="0">
-                  <p:tgtEl>
-                    <p:sldTgt/>
-                  </p:tgtEl>
-                </p:cond>
-              </p:prevCondLst>
-              <p:nextCondLst>
-                <p:cond evt="onNext" delay="0">
-                  <p:tgtEl>
-                    <p:sldTgt/>
-                  </p:tgtEl>
-                </p:cond>
-              </p:nextCondLst>
-            </p:seq>
-          </p:childTnLst>
-        </p:cTn>
-      </p:par>
-    </p:tnLst>
-    <p:bldLst>
-      <p:bldP spid="2" grpId="3" animBg="1"/>
-      <p:bldP spid="3" grpId="4" animBg="1"/>
-    </p:bldLst>
-  </p:timing>
-</p:sld>
-</file>
-
-<file path=ppt/slides/slide2.xml><?xml version="1.0" encoding="utf-8"?>
-<p:sld xmlns:a="http://schemas.openxmlformats.org/drawingml/2006/main" xmlns:r="http://schemas.openxmlformats.org/officeDocument/2006/relationships" xmlns:mc="http://schemas.openxmlformats.org/markup-compatibility/2006" xmlns:mv="urn:schemas-microsoft-com:mac:vml" xmlns:p="http://schemas.openxmlformats.org/presentationml/2006/main" mc:Ignorable="mv" mc:PreserveAttributes="mv:*">
-  <p:cSld>
-    <p:spTree>
-      <p:nvGrpSpPr>
-        <p:cNvPr id="1" name="title"/>
-        <p:cNvGrpSpPr/>
-        <p:nvPr/>
-      </p:nvGrpSpPr>
-      <p:grpSpPr>
-        <a:xfrm>
-          <a:off x="0" y="0"/>
-          <a:ext cx="0" cy="0"/>
-          <a:chOff x="0" y="0"/>
-          <a:chExt cx="0" cy="0"/>
-        </a:xfrm>
-      </p:grpSpPr>
-      <p:sp>
-        <p:nvSpPr>
-          <p:cNvPr id="4" name="Title 1"/>
-          <p:cNvSpPr>
-            <a:spLocks noGrp="1"/>
-          </p:cNvSpPr>
-          <p:nvPr>
-            <p:ph type="title"/>
-          </p:nvPr>
-        </p:nvSpPr>
-        <p:spPr>
-          <a:xfrm>
-            <a:off x="0" y="0"/>
-            <a:ext cx="9164800" cy="1152000"/>
-          </a:xfrm>
-        </p:spPr>
-        <p:txBody>
-          <a:bodyPr/>
-          <a:lstStyle/>
-          <a:p>
-            <a:r>
-              <a:rPr lang="en-US" sz="4000" dirty="0" smtClean="0">
-                <a:solidFill>
-                  <a:srgbClr val="FF0000"/>
-                </a:solidFill>
-                <a:latin typeface="Times New Roman"/>
-                <a:cs typeface="Times New Roman"/>
-              </a:rPr>
-              <a:t>PPLineTest</a:t>
-            </a:r>
-            <a:endParaRPr lang="en-US" sz="4000" dirty="0">
-              <a:solidFill>
-                <a:srgbClr val="FF0000"/>
-              </a:solidFill>
-              <a:latin typeface="Times New Roman"/>
-              <a:cs typeface="Times New Roman"/>
-            </a:endParaRPr>
-          </a:p>
-        </p:txBody>
-      </p:sp>
-      <p:sp>
-        <p:nvSpPr>
-          <p:cNvPr id="5" name="PPLine#5"/>
-          <p:cNvSpPr>
-            <a:spLocks noChangeShapeType="1"/>
-          </p:cNvSpPr>
-          <p:nvPr/>
-        </p:nvSpPr>
-        <p:spPr bwMode="auto">
-          <a:xfrm>
-            <a:off x="0" y="0"/>
-            <a:ext cx="9164800" cy="6873600"/>
-          </a:xfrm>
-          <a:prstGeom prst="line">
-            <a:avLst/>
-          </a:prstGeom>
-          <a:noFill/>
-          <a:ln w="12800">
-            <a:solidFill>
-              <a:srgbClr val="000000"/>
-            </a:solidFill>
-            <a:prstDash val="solid"/>
-            <a:round/>
-            <a:headEnd/>
-            <a:tailEnd/>
-          </a:ln>
-          <a:effectLst/>
-        </p:spPr>
-      </p:sp>
-      <p:sp>
-        <p:nvSpPr>
-          <p:cNvPr id="6" name="PPLine#6"/>
-          <p:cNvSpPr>
-            <a:spLocks noChangeShapeType="1"/>
-          </p:cNvSpPr>
-          <p:nvPr/>
-        </p:nvSpPr>
-        <p:spPr bwMode="auto">
-          <a:xfrm flipV="1">
-            <a:off x="0" y="0"/>
-            <a:ext cx="9164800" cy="6873600"/>
-          </a:xfrm>
-          <a:prstGeom prst="line">
-            <a:avLst/>
-          </a:prstGeom>
-          <a:noFill/>
-          <a:ln w="12800">
-            <a:solidFill>
-              <a:srgbClr val="000000"/>
-            </a:solidFill>
-            <a:prstDash val="solid"/>
-            <a:round/>
-            <a:headEnd/>
-            <a:tailEnd/>
-          </a:ln>
-          <a:effectLst/>
-        </p:spPr>
-      </p:sp>
-    </p:spTree>
-  </p:cSld>
-  <p:clrMapOvr>
-    <a:masterClrMapping/>
-  </p:clrMapOvr>
-  <p:transition/>
-  <p:timing>
-    <p:tnLst>
-      <p:par>
-        <p:cTn id="2" dur="indefinite" restart="never" nodeType="tmRoot"/>
-      </p:par>
-    </p:tnLst>
-  </p:timing>
-</p:sld>
-</file>
-
-<file path=ppt/slides/slide3.xml><?xml version="1.0" encoding="utf-8"?>
-<p:sld xmlns:a="http://schemas.openxmlformats.org/drawingml/2006/main" xmlns:r="http://schemas.openxmlformats.org/officeDocument/2006/relationships" xmlns:mc="http://schemas.openxmlformats.org/markup-compatibility/2006" xmlns:mv="urn:schemas-microsoft-com:mac:vml" xmlns:p="http://schemas.openxmlformats.org/presentationml/2006/main" mc:Ignorable="mv" mc:PreserveAttributes="mv:*">
-  <p:cSld>
-    <p:spTree>
-      <p:nvGrpSpPr>
-        <p:cNvPr id="1" name="title"/>
-        <p:cNvGrpSpPr/>
-        <p:nvPr/>
-      </p:nvGrpSpPr>
-      <p:grpSpPr>
-        <a:xfrm>
-          <a:off x="0" y="0"/>
-          <a:ext cx="0" cy="0"/>
-          <a:chOff x="0" y="0"/>
-          <a:chExt cx="0" cy="0"/>
-        </a:xfrm>
-      </p:grpSpPr>
-      <p:sp>
-        <p:nvSpPr>
-          <p:cNvPr id="7" name="Title 1"/>
-          <p:cNvSpPr>
-            <a:spLocks noGrp="1"/>
-          </p:cNvSpPr>
-          <p:nvPr>
-            <p:ph type="title"/>
-          </p:nvPr>
-        </p:nvSpPr>
-        <p:spPr>
-          <a:xfrm>
-            <a:off x="0" y="0"/>
-            <a:ext cx="9164800" cy="1152000"/>
-          </a:xfrm>
-        </p:spPr>
-        <p:txBody>
-          <a:bodyPr/>
-          <a:lstStyle/>
-          <a:p>
-            <a:r>
-              <a:rPr lang="en-US" sz="4000" dirty="0" smtClean="0">
-                <a:solidFill>
-                  <a:srgbClr val="FF0000"/>
-                </a:solidFill>
-                <a:latin typeface="Times New Roman"/>
-                <a:cs typeface="Times New Roman"/>
-              </a:rPr>
-              <a:t>PPRectTest</a:t>
-            </a:r>
-            <a:endParaRPr lang="en-US" sz="4000" dirty="0">
-              <a:solidFill>
-                <a:srgbClr val="FF0000"/>
-              </a:solidFill>
-              <a:latin typeface="Times New Roman"/>
-              <a:cs typeface="Times New Roman"/>
-            </a:endParaRPr>
-          </a:p>
-        </p:txBody>
-      </p:sp>
-      <p:sp>
-        <p:nvSpPr>
-          <p:cNvPr id="8" name="PPRect#8"/>
-          <p:cNvSpPr/>
-          <p:nvPr/>
-        </p:nvSpPr>
-        <p:spPr bwMode="auto">
-          <a:xfrm>
-            <a:off x="2560000" y="1280000"/>
-            <a:ext cx="1280000" cy="1280000"/>
-          </a:xfrm>
-          <a:prstGeom prst="rect">
-            <a:avLst/>
-          </a:prstGeom>
-          <a:solidFill>
-            <a:srgbClr val="FF0000"/>
-          </a:solidFill>
-          <a:ln w="12800" cap="flat" cmpd="sng" algn="ctr">
-            <a:solidFill>
-              <a:srgbClr val="FF0000"/>
-            </a:solidFill>
-            <a:prstDash val="solid"/>
-            <a:round/>
-            <a:headEnd/>
-            <a:tailEnd/>
-          </a:ln>
-          <a:effectLst/>
-        </p:spPr>
-        <p:txBody>
-          <a:bodyPr vert="horz" wrap="square" lIns="0" tIns="0" rIns="0" bIns="0" anchor="ctr" anchorCtr="0" numCol="1" rtlCol="0" compatLnSpc="1">
-            <a:prstTxWarp prst="textNoShape">
-              <a:avLst/>
-            </a:prstTxWarp>
-          </a:bodyPr>
-          <a:lstStyle/>
-          <a:p>
-            <a:pPr marL="0" marR="0" indent="0" algn="ctr" defTabSz="914400" rtl="0" eaLnBrk="0" fontAlgn="base" latinLnBrk="0" hangingPunct="0">
-              <a:lnSpc>
-                <a:spcPct val="100000"/>
-              </a:lnSpc>
-              <a:spcBef>
-                <a:spcPct val="0"/>
-              </a:spcBef>
-              <a:spcAft>
-                <a:spcPct val="0"/>
-              </a:spcAft>
-              <a:buClrTx/>
-              <a:buSzTx/>
-              <a:buFontTx/>
-              <a:buNone/>
-              <a:tabLst/>
-            </a:pPr>
-            <a:r>
-              <a:rPr kumimoji="0" lang="en-US" sz="2400" b="0" i="0" u="none" strike="noStrike" cap="none" normalizeH="0" baseline="0" smtClean="0">
-                <a:ln>
-                  <a:noFill/>
-                </a:ln>
-                <a:solidFill>
-                  <a:schemeClr val="tx1"/>
-                </a:solidFill>
-                <a:effectLst/>
-                <a:latin typeface="Times New Roman" pitchFamily="84" charset="0"/>
-              </a:rPr>
-              <a:t/>
-            </a:r>
-          </a:p>
-        </p:txBody>
-      </p:sp>
-    </p:spTree>
-  </p:cSld>
-  <p:clrMapOvr>
-    <a:masterClrMapping/>
-  </p:clrMapOvr>
-  <p:transition/>
-  <p:timing>
-    <p:tnLst>
-      <p:par>
-        <p:cTn id="2" dur="indefinite" restart="never" nodeType="tmRoot"/>
-      </p:par>
-    </p:tnLst>
-  </p:timing>
-</p:sld>
-</file>
-
-<file path=ppt/slides/slide4.xml><?xml version="1.0" encoding="utf-8"?>
-<p:sld xmlns:a="http://schemas.openxmlformats.org/drawingml/2006/main" xmlns:r="http://schemas.openxmlformats.org/officeDocument/2006/relationships" xmlns:mc="http://schemas.openxmlformats.org/markup-compatibility/2006" xmlns:mv="urn:schemas-microsoft-com:mac:vml" xmlns:p="http://schemas.openxmlformats.org/presentationml/2006/main" mc:Ignorable="mv" mc:PreserveAttributes="mv:*">
-  <p:cSld>
-    <p:spTree>
-      <p:nvGrpSpPr>
-        <p:cNvPr id="1" name="title"/>
-        <p:cNvGrpSpPr/>
-        <p:nvPr/>
-      </p:nvGrpSpPr>
-      <p:grpSpPr>
-        <a:xfrm>
-          <a:off x="0" y="0"/>
-          <a:ext cx="0" cy="0"/>
-          <a:chOff x="0" y="0"/>
-          <a:chExt cx="0" cy="0"/>
-        </a:xfrm>
-      </p:grpSpPr>
-      <p:sp>
-        <p:nvSpPr>
-          <p:cNvPr id="9" name="Title 1"/>
-          <p:cNvSpPr>
-            <a:spLocks noGrp="1"/>
-          </p:cNvSpPr>
-          <p:nvPr>
-            <p:ph type="title"/>
-          </p:nvPr>
-        </p:nvSpPr>
-        <p:spPr>
-          <a:xfrm>
-            <a:off x="0" y="0"/>
-            <a:ext cx="9164800" cy="1152000"/>
-          </a:xfrm>
-        </p:spPr>
-        <p:txBody>
-          <a:bodyPr/>
-          <a:lstStyle/>
-          <a:p>
-            <a:r>
-              <a:rPr lang="en-US" sz="4000" dirty="0" smtClean="0">
-                <a:solidFill>
-                  <a:srgbClr val="FF0000"/>
-                </a:solidFill>
-                <a:latin typeface="Times New Roman"/>
-                <a:cs typeface="Times New Roman"/>
-              </a:rPr>
-              <a:t>PPOvalTest</a:t>
-            </a:r>
-            <a:endParaRPr lang="en-US" sz="4000" dirty="0">
-              <a:solidFill>
-                <a:srgbClr val="FF0000"/>
-              </a:solidFill>
-              <a:latin typeface="Times New Roman"/>
-              <a:cs typeface="Times New Roman"/>
-            </a:endParaRPr>
-          </a:p>
-        </p:txBody>
-      </p:sp>
-      <p:sp>
-        <p:nvSpPr>
-          <p:cNvPr id="10" name="PPOval#10"/>
-          <p:cNvSpPr/>
-          <p:nvPr/>
-        </p:nvSpPr>
-        <p:spPr bwMode="auto">
-          <a:xfrm>
-            <a:off x="3942400" y="2796800"/>
-            <a:ext cx="1280000" cy="1280000"/>
-          </a:xfrm>
-          <a:prstGeom prst="ellipse">
-            <a:avLst/>
-          </a:prstGeom>
-          <a:solidFill>
-            <a:srgbClr val="000000"/>
-          </a:solidFill>
-          <a:ln w="12800" cap="flat" cmpd="sng" algn="ctr">
-            <a:solidFill>
-              <a:srgbClr val="000000"/>
-            </a:solidFill>
-            <a:prstDash val="solid"/>
-            <a:round/>
-            <a:headEnd/>
-            <a:tailEnd/>
-          </a:ln>
-          <a:effectLst/>
-        </p:spPr>
-        <p:txBody>
-          <a:bodyPr vert="horz" wrap="square" lIns="0" tIns="0" rIns="0" bIns="0" anchor="ctr" anchorCtr="0" numCol="1" rtlCol="0" compatLnSpc="1">
-            <a:prstTxWarp prst="textNoShape">
-              <a:avLst/>
-            </a:prstTxWarp>
-          </a:bodyPr>
-          <a:lstStyle/>
-          <a:p>
-            <a:pPr marL="0" marR="0" indent="0" algn="ctr" defTabSz="914400" rtl="0" eaLnBrk="0" fontAlgn="base" latinLnBrk="0" hangingPunct="0">
-              <a:lnSpc>
-                <a:spcPct val="100000"/>
-              </a:lnSpc>
-              <a:spcBef>
-                <a:spcPct val="0"/>
-              </a:spcBef>
-              <a:spcAft>
-                <a:spcPct val="0"/>
-              </a:spcAft>
-              <a:buClrTx/>
-              <a:buSzTx/>
-              <a:buFontTx/>
-              <a:buNone/>
-              <a:tabLst/>
-            </a:pPr>
-            <a:r>
-              <a:rPr kumimoji="0" lang="en-US" sz="2400" b="0" i="0" u="none" strike="noStrike" cap="none" normalizeH="0" baseline="0" smtClean="0">
-                <a:ln>
-                  <a:noFill/>
-                </a:ln>
-                <a:solidFill>
-                  <a:schemeClr val="tx1"/>
-                </a:solidFill>
-                <a:effectLst/>
-                <a:latin typeface="Times New Roman" pitchFamily="84" charset="0"/>
-              </a:rPr>
-              <a:t/>
-            </a:r>
-          </a:p>
-        </p:txBody>
-      </p:sp>
-    </p:spTree>
-  </p:cSld>
-  <p:clrMapOvr>
-    <a:masterClrMapping/>
-  </p:clrMapOvr>
-  <p:transition/>
-  <p:timing>
-    <p:tnLst>
-      <p:par>
-        <p:cTn id="2" dur="indefinite" restart="never" nodeType="tmRoot"/>
-      </p:par>
-    </p:tnLst>
-  </p:timing>
-</p:sld>
-</file>
-
-<file path=ppt/slides/slide5.xml><?xml version="1.0" encoding="utf-8"?>
-<p:sld xmlns:a="http://schemas.openxmlformats.org/drawingml/2006/main" xmlns:r="http://schemas.openxmlformats.org/officeDocument/2006/relationships" xmlns:mc="http://schemas.openxmlformats.org/markup-compatibility/2006" xmlns:mv="urn:schemas-microsoft-com:mac:vml" xmlns:p="http://schemas.openxmlformats.org/presentationml/2006/main" mc:Ignorable="mv" mc:PreserveAttributes="mv:*">
-  <p:cSld>
-    <p:spTree>
-      <p:nvGrpSpPr>
-        <p:cNvPr id="1" name="title"/>
-        <p:cNvGrpSpPr/>
-        <p:nvPr/>
-      </p:nvGrpSpPr>
-      <p:grpSpPr>
-        <a:xfrm>
-          <a:off x="0" y="0"/>
-          <a:ext cx="0" cy="0"/>
-          <a:chOff x="0" y="0"/>
-          <a:chExt cx="0" cy="0"/>
-        </a:xfrm>
-      </p:grpSpPr>
-      <p:sp>
-        <p:nvSpPr>
-          <p:cNvPr id="11" name="Title 1"/>
-          <p:cNvSpPr>
-            <a:spLocks noGrp="1"/>
-          </p:cNvSpPr>
-          <p:nvPr>
-            <p:ph type="title"/>
-          </p:nvPr>
-        </p:nvSpPr>
-        <p:spPr>
-          <a:xfrm>
-            <a:off x="0" y="0"/>
-            <a:ext cx="9164800" cy="1152000"/>
-          </a:xfrm>
-        </p:spPr>
-        <p:txBody>
-          <a:bodyPr/>
-          <a:lstStyle/>
-          <a:p>
-            <a:r>
-              <a:rPr lang="en-US" sz="4000" dirty="0" smtClean="0">
-                <a:solidFill>
-                  <a:srgbClr val="FF0000"/>
-                </a:solidFill>
-                <a:latin typeface="Times New Roman"/>
-                <a:cs typeface="Times New Roman"/>
-              </a:rPr>
-              <a:t>PPTextBoxTest</a:t>
-            </a:r>
-            <a:endParaRPr lang="en-US" sz="4000" dirty="0">
-              <a:solidFill>
-                <a:srgbClr val="FF0000"/>
-              </a:solidFill>
-              <a:latin typeface="Times New Roman"/>
-              <a:cs typeface="Times New Roman"/>
-            </a:endParaRPr>
-          </a:p>
-        </p:txBody>
-      </p:sp>
-      <p:sp>
-        <p:nvSpPr>
-          <p:cNvPr id="12" name="PPTextBox#12"/>
-          <p:cNvSpPr/>
-          <p:nvPr/>
-        </p:nvSpPr>
-        <p:spPr bwMode="auto">
-          <a:xfrm>
-            <a:off x="3264000" y="3200000"/>
-            <a:ext cx="2636800" cy="473600"/>
-          </a:xfrm>
-          <a:prstGeom prst="rect">
-            <a:avLst/>
-          </a:prstGeom>
-          <a:noFill/>
-          <a:ln>
-            <a:noFill/>
-          </a:ln>
-          <a:effectLst/>
-        </p:spPr>
-        <p:txBody>
-          <a:bodyPr vert="horz" wrap="square" lIns="0" tIns="0" rIns="0" bIns="0" anchor="t" anchorCtr="0" numCol="1" rtlCol="0" compatLnSpc="1">
-            <a:prstTxWarp prst="textNoShape">
-              <a:avLst/>
-            </a:prstTxWarp>
-          </a:bodyPr>
-          <a:lstStyle/>
-          <a:p>
-            <a:pPr marL="0" marR="0" indent="0" algn="l" defTabSz="914400" rtl="0" eaLnBrk="0" fontAlgn="base" latinLnBrk="0" hangingPunct="0">
-              <a:lnSpc>
-                <a:spcPct val="100000"/>
-              </a:lnSpc>
-              <a:spcBef>
-                <a:spcPct val="0"/>
-              </a:spcBef>
-              <a:spcAft>
-                <a:spcPct val="0"/>
-              </a:spcAft>
-              <a:buClrTx/>
-              <a:buSzTx/>
-              <a:buFontTx/>
-              <a:buNone/>
-              <a:tabLst/>
-            </a:pPr>
-            <a:r>
-              <a:rPr kumimoji="0" lang="en-US" sz="3600" b="1" i="0" u="none" strike="noStrike" cap="none" normalizeH="0" baseline="0" smtClean="0">
-                <a:ln>
-                  <a:noFill/>
-                </a:ln>
-                <a:solidFill>
-                  <a:schemeClr val="tx1"/>
-                </a:solidFill>
-                <a:effectLst/>
-                <a:latin typeface="Helvetica" pitchFamily="84" charset="0"/>
-              </a:rPr>
-              <a:t>hello, world</a:t>
-            </a:r>
-          </a:p>
-        </p:txBody>
-      </p:sp>
-    </p:spTree>
-  </p:cSld>
-  <p:clrMapOvr>
-    <a:masterClrMapping/>
-  </p:clrMapOvr>
-  <p:transition/>
-  <p:timing>
-    <p:tnLst>
-      <p:par>
-        <p:cTn id="2" dur="indefinite" restart="never" nodeType="tmRoot"/>
-      </p:par>
-    </p:tnLst>
-  </p:timing>
-</p:sld>
-</file>
-
-<file path=ppt/slides/slide6.xml><?xml version="1.0" encoding="utf-8"?>
-<p:sld xmlns:a="http://schemas.openxmlformats.org/drawingml/2006/main" xmlns:r="http://schemas.openxmlformats.org/officeDocument/2006/relationships" xmlns:mc="http://schemas.openxmlformats.org/markup-compatibility/2006" xmlns:mv="urn:schemas-microsoft-com:mac:vml" xmlns:p="http://schemas.openxmlformats.org/presentationml/2006/main" mc:Ignorable="mv" mc:PreserveAttributes="mv:*">
-  <p:cSld>
-    <p:spTree>
-      <p:nvGrpSpPr>
-        <p:cNvPr id="1" name="title"/>
-        <p:cNvGrpSpPr/>
-        <p:nvPr/>
-      </p:nvGrpSpPr>
-      <p:grpSpPr>
-        <a:xfrm>
-          <a:off x="0" y="0"/>
-          <a:ext cx="0" cy="0"/>
-          <a:chOff x="0" y="0"/>
-          <a:chExt cx="0" cy="0"/>
-        </a:xfrm>
-      </p:grpSpPr>
-      <p:sp>
-        <p:nvSpPr>
-          <p:cNvPr id="13" name="Title 1"/>
-          <p:cNvSpPr>
-            <a:spLocks noGrp="1"/>
-          </p:cNvSpPr>
-          <p:nvPr>
-            <p:ph type="title"/>
-          </p:nvPr>
-        </p:nvSpPr>
-        <p:spPr>
-          <a:xfrm>
-            <a:off x="0" y="0"/>
-            <a:ext cx="9164800" cy="1152000"/>
-          </a:xfrm>
-        </p:spPr>
-        <p:txBody>
-          <a:bodyPr/>
-          <a:lstStyle/>
-          <a:p>
-            <a:r>
-              <a:rPr lang="en-US" sz="4000" dirty="0" smtClean="0">
-                <a:solidFill>
-                  <a:srgbClr val="FF0000"/>
-                </a:solidFill>
-                <a:latin typeface="Times New Roman"/>
-                <a:cs typeface="Times New Roman"/>
-              </a:rPr>
-              <a:t>Testing yo</a:t>
-            </a:r>
-            <a:endParaRPr lang="en-US" sz="4000" dirty="0">
-              <a:solidFill>
-                <a:srgbClr val="FF0000"/>
-              </a:solidFill>
-              <a:latin typeface="Times New Roman"/>
-              <a:cs typeface="Times New Roman"/>
-            </a:endParaRPr>
-          </a:p>
-        </p:txBody>
-      </p:sp>
-      <p:sp>
-        <p:nvSpPr>
-          <p:cNvPr id="21" name="PPOval#21"/>
-          <p:cNvSpPr/>
-          <p:nvPr/>
-        </p:nvSpPr>
-        <p:spPr bwMode="auto">
-          <a:xfrm>
-            <a:off x="3840000" y="3840000"/>
-            <a:ext cx="2560000" cy="1280000"/>
-          </a:xfrm>
-          <a:prstGeom prst="ellipse">
-            <a:avLst/>
-          </a:prstGeom>
-          <a:solidFill>
-            <a:srgbClr val="FFFFFF"/>
-          </a:solidFill>
-          <a:ln w="12800" cap="flat" cmpd="sng" algn="ctr">
-            <a:solidFill>
-              <a:srgbClr val="000000"/>
-            </a:solidFill>
-            <a:prstDash val="solid"/>
-            <a:round/>
-            <a:headEnd/>
-            <a:tailEnd/>
-          </a:ln>
-          <a:effectLst/>
-        </p:spPr>
-        <p:txBody>
-          <a:bodyPr vert="horz" wrap="square" lIns="0" tIns="0" rIns="0" bIns="0" anchor="ctr" anchorCtr="0" numCol="1" rtlCol="0" compatLnSpc="1">
-            <a:prstTxWarp prst="textNoShape">
-              <a:avLst/>
-            </a:prstTxWarp>
-          </a:bodyPr>
-          <a:lstStyle/>
-          <a:p>
-            <a:pPr marL="0" marR="0" indent="0" algn="ctr" defTabSz="914400" rtl="0" eaLnBrk="0" fontAlgn="base" latinLnBrk="0" hangingPunct="0">
-              <a:lnSpc>
-                <a:spcPct val="100000"/>
-              </a:lnSpc>
-              <a:spcBef>
-                <a:spcPct val="0"/>
-              </a:spcBef>
-              <a:spcAft>
-                <a:spcPct val="0"/>
-              </a:spcAft>
-              <a:buClrTx/>
-              <a:buSzTx/>
-              <a:buFontTx/>
-              <a:buNone/>
-              <a:tabLst/>
-            </a:pPr>
-            <a:r>
-              <a:rPr kumimoji="0" lang="en-US" sz="2400" b="0" i="0" u="none" strike="noStrike" cap="none" normalizeH="0" baseline="0" smtClean="0">
-                <a:ln>
-                  <a:noFill/>
-                </a:ln>
-                <a:solidFill>
-                  <a:schemeClr val="tx1"/>
-                </a:solidFill>
-                <a:effectLst/>
-                <a:latin typeface="Times New Roman" pitchFamily="84" charset="0"/>
-              </a:rPr>
-              <a:t/>
-            </a:r>
-          </a:p>
-        </p:txBody>
-      </p:sp>
-      <p:sp>
-        <p:nvSpPr>
-          <p:cNvPr id="14" name="PPRect#14"/>
-          <p:cNvSpPr/>
-          <p:nvPr/>
-        </p:nvSpPr>
-        <p:spPr bwMode="auto">
-          <a:xfrm>
-            <a:off x="5120000" y="0"/>
-            <a:ext cx="1280000" cy="1280000"/>
-          </a:xfrm>
-          <a:prstGeom prst="rect">
-            <a:avLst/>
-          </a:prstGeom>
-          <a:solidFill>
-            <a:srgbClr val="000000"/>
-          </a:solidFill>
-          <a:ln w="12800" cap="flat" cmpd="sng" algn="ctr">
-            <a:solidFill>
-              <a:srgbClr val="000000"/>
-            </a:solidFill>
-            <a:prstDash val="solid"/>
-            <a:round/>
-            <a:headEnd/>
-            <a:tailEnd/>
-          </a:ln>
-          <a:effectLst/>
-        </p:spPr>
-        <p:txBody>
-          <a:bodyPr vert="horz" wrap="square" lIns="0" tIns="0" rIns="0" bIns="0" anchor="ctr" anchorCtr="0" numCol="1" rtlCol="0" compatLnSpc="1">
-            <a:prstTxWarp prst="textNoShape">
-              <a:avLst/>
-            </a:prstTxWarp>
-          </a:bodyPr>
-          <a:lstStyle/>
-          <a:p>
-            <a:pPr marL="0" marR="0" indent="0" algn="ctr" defTabSz="914400" rtl="0" eaLnBrk="0" fontAlgn="base" latinLnBrk="0" hangingPunct="0">
-              <a:lnSpc>
-                <a:spcPct val="100000"/>
-              </a:lnSpc>
-              <a:spcBef>
-                <a:spcPct val="0"/>
-              </a:spcBef>
-              <a:spcAft>
-                <a:spcPct val="0"/>
-              </a:spcAft>
-              <a:buClrTx/>
-              <a:buSzTx/>
-              <a:buFontTx/>
-              <a:buNone/>
-              <a:tabLst/>
-            </a:pPr>
-            <a:r>
-              <a:rPr kumimoji="0" lang="en-US" sz="2400" b="0" i="0" u="none" strike="noStrike" cap="none" normalizeH="0" baseline="0" smtClean="0">
-                <a:ln>
-                  <a:noFill/>
-                </a:ln>
-                <a:solidFill>
-                  <a:schemeClr val="tx1"/>
-                </a:solidFill>
-                <a:effectLst/>
-                <a:latin typeface="Times New Roman" pitchFamily="84" charset="0"/>
-              </a:rPr>
-              <a:t/>
-            </a:r>
-          </a:p>
-        </p:txBody>
-      </p:sp>
-      <p:sp>
-        <p:nvSpPr>
-          <p:cNvPr id="15" name="PPRect#15"/>
-          <p:cNvSpPr/>
-          <p:nvPr/>
-        </p:nvSpPr>
-        <p:spPr bwMode="auto">
-          <a:xfrm>
-            <a:off x="1280000" y="1280000"/>
-            <a:ext cx="1280000" cy="1280000"/>
-          </a:xfrm>
-          <a:prstGeom prst="rect">
-            <a:avLst/>
-          </a:prstGeom>
-          <a:solidFill>
-            <a:srgbClr val="FFFF00"/>
-          </a:solidFill>
-          <a:ln w="12800" cap="flat" cmpd="sng" algn="ctr">
-            <a:solidFill>
-              <a:srgbClr val="000000"/>
-            </a:solidFill>
-            <a:prstDash val="solid"/>
-            <a:round/>
-            <a:headEnd/>
-            <a:tailEnd/>
-          </a:ln>
-          <a:effectLst/>
-        </p:spPr>
-        <p:txBody>
-          <a:bodyPr vert="horz" wrap="square" lIns="0" tIns="0" rIns="0" bIns="0" anchor="ctr" anchorCtr="0" numCol="1" rtlCol="0" compatLnSpc="1">
-            <a:prstTxWarp prst="textNoShape">
-              <a:avLst/>
-            </a:prstTxWarp>
-          </a:bodyPr>
-          <a:lstStyle/>
-          <a:p>
-            <a:pPr marL="0" marR="0" indent="0" algn="ctr" defTabSz="914400" rtl="0" eaLnBrk="0" fontAlgn="base" latinLnBrk="0" hangingPunct="0">
-              <a:lnSpc>
-                <a:spcPct val="100000"/>
-              </a:lnSpc>
-              <a:spcBef>
-                <a:spcPct val="0"/>
-              </a:spcBef>
-              <a:spcAft>
-                <a:spcPct val="0"/>
-              </a:spcAft>
-              <a:buClrTx/>
-              <a:buSzTx/>
-              <a:buFontTx/>
-              <a:buNone/>
-              <a:tabLst/>
-            </a:pPr>
-            <a:r>
-              <a:rPr kumimoji="0" lang="en-US" sz="2400" b="0" i="0" u="none" strike="noStrike" cap="none" normalizeH="0" baseline="0" smtClean="0">
-                <a:ln>
-                  <a:noFill/>
-                </a:ln>
-                <a:solidFill>
-                  <a:schemeClr val="tx1"/>
-                </a:solidFill>
-                <a:effectLst/>
-                <a:latin typeface="Times New Roman" pitchFamily="84" charset="0"/>
-              </a:rPr>
-              <a:t/>
-            </a:r>
-          </a:p>
-        </p:txBody>
-      </p:sp>
-      <p:sp>
-        <p:nvSpPr>
-          <p:cNvPr id="16" name="PPRect#16"/>
-          <p:cNvSpPr/>
-          <p:nvPr/>
-        </p:nvSpPr>
-        <p:spPr bwMode="auto">
-          <a:xfrm>
-            <a:off x="3840000" y="2560000"/>
-            <a:ext cx="3840000" cy="1280000"/>
-          </a:xfrm>
-          <a:prstGeom prst="rect">
-            <a:avLst/>
-          </a:prstGeom>
-          <a:solidFill>
-            <a:srgbClr val="0000FF"/>
-          </a:solidFill>
-          <a:ln w="12800" cap="flat" cmpd="sng" algn="ctr">
-            <a:solidFill>
-              <a:srgbClr val="000000"/>
-            </a:solidFill>
-            <a:prstDash val="solid"/>
-            <a:round/>
-            <a:headEnd/>
-            <a:tailEnd/>
-          </a:ln>
-          <a:effectLst/>
-        </p:spPr>
-        <p:txBody>
-          <a:bodyPr vert="horz" wrap="square" lIns="0" tIns="0" rIns="0" bIns="0" anchor="ctr" anchorCtr="0" numCol="1" rtlCol="0" compatLnSpc="1">
-            <a:prstTxWarp prst="textNoShape">
-              <a:avLst/>
-            </a:prstTxWarp>
-          </a:bodyPr>
-          <a:lstStyle/>
-          <a:p>
-            <a:pPr marL="0" marR="0" indent="0" algn="ctr" defTabSz="914400" rtl="0" eaLnBrk="0" fontAlgn="base" latinLnBrk="0" hangingPunct="0">
-              <a:lnSpc>
-                <a:spcPct val="100000"/>
-              </a:lnSpc>
-              <a:spcBef>
-                <a:spcPct val="0"/>
-              </a:spcBef>
-              <a:spcAft>
-                <a:spcPct val="0"/>
-              </a:spcAft>
-              <a:buClrTx/>
-              <a:buSzTx/>
-              <a:buFontTx/>
-              <a:buNone/>
-              <a:tabLst/>
-            </a:pPr>
-            <a:r>
-              <a:rPr kumimoji="0" lang="en-US" sz="2400" b="0" i="0" u="none" strike="noStrike" cap="none" normalizeH="0" baseline="0" smtClean="0">
-                <a:ln>
-                  <a:noFill/>
-                </a:ln>
-                <a:solidFill>
-                  <a:schemeClr val="tx1"/>
-                </a:solidFill>
-                <a:effectLst/>
-                <a:latin typeface="Times New Roman" pitchFamily="84" charset="0"/>
-              </a:rPr>
-              <a:t/>
-            </a:r>
-          </a:p>
-        </p:txBody>
-      </p:sp>
-      <p:sp>
-        <p:nvSpPr>
-          <p:cNvPr id="17" name="PPRect#17"/>
-          <p:cNvSpPr/>
-          <p:nvPr/>
-        </p:nvSpPr>
-        <p:spPr bwMode="auto">
-          <a:xfrm>
-            <a:off x="2560000" y="5120000"/>
-            <a:ext cx="1280000" cy="1280000"/>
-          </a:xfrm>
-          <a:prstGeom prst="rect">
-            <a:avLst/>
-          </a:prstGeom>
-          <a:solidFill>
-            <a:srgbClr val="FF0000"/>
-          </a:solidFill>
-          <a:ln w="12800" cap="flat" cmpd="sng" algn="ctr">
-            <a:solidFill>
-              <a:srgbClr val="000000"/>
-            </a:solidFill>
-            <a:prstDash val="solid"/>
-            <a:round/>
-            <a:headEnd/>
-            <a:tailEnd/>
-          </a:ln>
-          <a:effectLst/>
-        </p:spPr>
-        <p:txBody>
-          <a:bodyPr vert="horz" wrap="square" lIns="0" tIns="0" rIns="0" bIns="0" anchor="ctr" anchorCtr="0" numCol="1" rtlCol="0" compatLnSpc="1">
-            <a:prstTxWarp prst="textNoShape">
-              <a:avLst/>
-            </a:prstTxWarp>
-          </a:bodyPr>
-          <a:lstStyle/>
-          <a:p>
-            <a:pPr marL="0" marR="0" indent="0" algn="ctr" defTabSz="914400" rtl="0" eaLnBrk="0" fontAlgn="base" latinLnBrk="0" hangingPunct="0">
-              <a:lnSpc>
-                <a:spcPct val="100000"/>
-              </a:lnSpc>
-              <a:spcBef>
-                <a:spcPct val="0"/>
-              </a:spcBef>
-              <a:spcAft>
-                <a:spcPct val="0"/>
-              </a:spcAft>
-              <a:buClrTx/>
-              <a:buSzTx/>
-              <a:buFontTx/>
-              <a:buNone/>
-              <a:tabLst/>
-            </a:pPr>
-            <a:r>
-              <a:rPr kumimoji="0" lang="en-US" sz="2400" b="0" i="0" u="none" strike="noStrike" cap="none" normalizeH="0" baseline="0" smtClean="0">
-                <a:ln>
-                  <a:noFill/>
-                </a:ln>
-                <a:solidFill>
-                  <a:schemeClr val="tx1"/>
-                </a:solidFill>
-                <a:effectLst/>
-                <a:latin typeface="Times New Roman" pitchFamily="84" charset="0"/>
-              </a:rPr>
-              <a:t/>
-            </a:r>
-          </a:p>
-        </p:txBody>
-      </p:sp>
-      <p:sp>
-        <p:nvSpPr>
-          <p:cNvPr id="18" name="PPRect#18"/>
-          <p:cNvSpPr/>
-          <p:nvPr/>
-        </p:nvSpPr>
-        <p:spPr bwMode="auto">
-          <a:xfrm>
-            <a:off x="2560000" y="1280000"/>
-            <a:ext cx="1280000" cy="1280000"/>
-          </a:xfrm>
-          <a:prstGeom prst="rect">
-            <a:avLst/>
-          </a:prstGeom>
-          <a:solidFill>
-            <a:srgbClr val="FFC800"/>
-          </a:solidFill>
-          <a:ln w="12800" cap="flat" cmpd="sng" algn="ctr">
-            <a:solidFill>
-              <a:srgbClr val="000000"/>
-            </a:solidFill>
-            <a:prstDash val="solid"/>
-            <a:round/>
-            <a:headEnd/>
-            <a:tailEnd/>
-          </a:ln>
-          <a:effectLst/>
-        </p:spPr>
-        <p:txBody>
-          <a:bodyPr vert="horz" wrap="square" lIns="0" tIns="0" rIns="0" bIns="0" anchor="ctr" anchorCtr="0" numCol="1" rtlCol="0" compatLnSpc="1">
-            <a:prstTxWarp prst="textNoShape">
-              <a:avLst/>
-            </a:prstTxWarp>
-          </a:bodyPr>
-          <a:lstStyle/>
-          <a:p>
-            <a:pPr marL="0" marR="0" indent="0" algn="ctr" defTabSz="914400" rtl="0" eaLnBrk="0" fontAlgn="base" latinLnBrk="0" hangingPunct="0">
-              <a:lnSpc>
-                <a:spcPct val="100000"/>
-              </a:lnSpc>
-              <a:spcBef>
-                <a:spcPct val="0"/>
-              </a:spcBef>
-              <a:spcAft>
-                <a:spcPct val="0"/>
-              </a:spcAft>
-              <a:buClrTx/>
-              <a:buSzTx/>
-              <a:buFontTx/>
-              <a:buNone/>
-              <a:tabLst/>
-            </a:pPr>
-            <a:r>
-              <a:rPr kumimoji="0" lang="en-US" sz="2400" b="0" i="0" u="none" strike="noStrike" cap="none" normalizeH="0" baseline="0" smtClean="0">
-                <a:ln>
-                  <a:noFill/>
-                </a:ln>
-                <a:solidFill>
-                  <a:schemeClr val="tx1"/>
-                </a:solidFill>
-                <a:effectLst/>
-                <a:latin typeface="Times New Roman" pitchFamily="84" charset="0"/>
-              </a:rPr>
-              <a:t/>
-            </a:r>
-          </a:p>
-        </p:txBody>
-      </p:sp>
-      <p:sp>
-        <p:nvSpPr>
-          <p:cNvPr id="19" name="PPRect#19"/>
-          <p:cNvSpPr/>
-          <p:nvPr/>
-        </p:nvSpPr>
-        <p:spPr bwMode="auto">
-          <a:xfrm>
-            <a:off x="5120000" y="3840000"/>
-            <a:ext cx="2560000" cy="1280000"/>
-          </a:xfrm>
-          <a:prstGeom prst="rect">
-            <a:avLst/>
-          </a:prstGeom>
-          <a:solidFill>
-            <a:srgbClr val="00FFFF"/>
-          </a:solidFill>
-          <a:ln w="12800" cap="flat" cmpd="sng" algn="ctr">
-            <a:solidFill>
-              <a:srgbClr val="000000"/>
-            </a:solidFill>
-            <a:prstDash val="solid"/>
-            <a:round/>
-            <a:headEnd/>
-            <a:tailEnd/>
-          </a:ln>
-          <a:effectLst/>
-        </p:spPr>
-        <p:txBody>
-          <a:bodyPr vert="horz" wrap="square" lIns="0" tIns="0" rIns="0" bIns="0" anchor="ctr" anchorCtr="0" numCol="1" rtlCol="0" compatLnSpc="1">
-            <a:prstTxWarp prst="textNoShape">
-              <a:avLst/>
-            </a:prstTxWarp>
-          </a:bodyPr>
-          <a:lstStyle/>
-          <a:p>
-            <a:pPr marL="0" marR="0" indent="0" algn="ctr" defTabSz="914400" rtl="0" eaLnBrk="0" fontAlgn="base" latinLnBrk="0" hangingPunct="0">
-              <a:lnSpc>
-                <a:spcPct val="100000"/>
-              </a:lnSpc>
-              <a:spcBef>
-                <a:spcPct val="0"/>
-              </a:spcBef>
-              <a:spcAft>
-                <a:spcPct val="0"/>
-              </a:spcAft>
-              <a:buClrTx/>
-              <a:buSzTx/>
-              <a:buFontTx/>
-              <a:buNone/>
-              <a:tabLst/>
-            </a:pPr>
-            <a:r>
-              <a:rPr kumimoji="0" lang="en-US" sz="2400" b="0" i="0" u="none" strike="noStrike" cap="none" normalizeH="0" baseline="0" smtClean="0">
-                <a:ln>
-                  <a:noFill/>
-                </a:ln>
-                <a:solidFill>
-                  <a:schemeClr val="tx1"/>
-                </a:solidFill>
-                <a:effectLst/>
-                <a:latin typeface="Times New Roman" pitchFamily="84" charset="0"/>
-              </a:rPr>
-              <a:t/>
-            </a:r>
-          </a:p>
-        </p:txBody>
-      </p:sp>
-      <p:sp>
-        <p:nvSpPr>
-          <p:cNvPr id="20" name="PPRect#20"/>
-          <p:cNvSpPr/>
-          <p:nvPr/>
-        </p:nvSpPr>
-        <p:spPr bwMode="auto">
-          <a:xfrm>
-            <a:off x="1280000" y="5120000"/>
-            <a:ext cx="1280000" cy="2560000"/>
-          </a:xfrm>
-          <a:prstGeom prst="rect">
-            <a:avLst/>
-          </a:prstGeom>
-          <a:solidFill>
-            <a:srgbClr val="FF00FF"/>
-          </a:solidFill>
-          <a:ln w="12800" cap="flat" cmpd="sng" algn="ctr">
-            <a:solidFill>
-              <a:srgbClr val="000000"/>
-            </a:solidFill>
-            <a:prstDash val="solid"/>
-            <a:round/>
-            <a:headEnd/>
-            <a:tailEnd/>
-          </a:ln>
-          <a:effectLst/>
-        </p:spPr>
-        <p:txBody>
-          <a:bodyPr vert="horz" wrap="square" lIns="0" tIns="0" rIns="0" bIns="0" anchor="ctr" anchorCtr="0" numCol="1" rtlCol="0" compatLnSpc="1">
-            <a:prstTxWarp prst="textNoShape">
-              <a:avLst/>
-            </a:prstTxWarp>
-          </a:bodyPr>
-          <a:lstStyle/>
-          <a:p>
-            <a:pPr marL="0" marR="0" indent="0" algn="ctr" defTabSz="914400" rtl="0" eaLnBrk="0" fontAlgn="base" latinLnBrk="0" hangingPunct="0">
-              <a:lnSpc>
-                <a:spcPct val="100000"/>
-              </a:lnSpc>
-              <a:spcBef>
-                <a:spcPct val="0"/>
-              </a:spcBef>
-              <a:spcAft>
-                <a:spcPct val="0"/>
-              </a:spcAft>
-              <a:buClrTx/>
-              <a:buSzTx/>
-              <a:buFontTx/>
-              <a:buNone/>
-              <a:tabLst/>
-            </a:pPr>
-            <a:r>
-              <a:rPr kumimoji="0" lang="en-US" sz="2400" b="0" i="0" u="none" strike="noStrike" cap="none" normalizeH="0" baseline="0" smtClean="0">
-                <a:ln>
-                  <a:noFill/>
-                </a:ln>
-                <a:solidFill>
-                  <a:schemeClr val="tx1"/>
-                </a:solidFill>
-                <a:effectLst/>
-                <a:latin typeface="Times New Roman" pitchFamily="84" charset="0"/>
-              </a:rPr>
-              <a:t/>
-            </a:r>
-          </a:p>
-        </p:txBody>
-      </p:sp>
-      <p:sp>
-        <p:nvSpPr>
-          <p:cNvPr id="22" name="PPLine#22"/>
-          <p:cNvSpPr>
-            <a:spLocks noChangeShapeType="1"/>
-          </p:cNvSpPr>
-          <p:nvPr/>
-        </p:nvSpPr>
-        <p:spPr bwMode="auto">
-          <a:xfrm>
-            <a:off x="0" y="0"/>
-            <a:ext cx="3840000" cy="3840000"/>
-          </a:xfrm>
-          <a:prstGeom prst="line">
-            <a:avLst/>
-          </a:prstGeom>
-          <a:noFill/>
-          <a:ln w="12800">
-            <a:solidFill>
-              <a:srgbClr val="000000"/>
-            </a:solidFill>
-            <a:prstDash val="solid"/>
-            <a:round/>
-            <a:headEnd/>
-            <a:tailEnd/>
-          </a:ln>
-          <a:effectLst/>
-        </p:spPr>
-      </p:sp>
-    </p:spTree>
-  </p:cSld>
-  <p:clrMapOvr>
-    <a:masterClrMapping/>
-  </p:clrMapOvr>
-  <p:transition/>
-  <p:timing>
-    <p:tnLst>
-      <p:par>
-        <p:cTn id="2" dur="indefinite" restart="never" nodeType="tmRoot">
-          <p:childTnLst>
-            <p:seq concurrent="1" nextAc="seek">
-              <p:cTn id="3" dur="indefinite" nodeType="mainSeq">
-                <p:childTnLst>
-                  <p:par>
-                    <p:cTn id="4" fill="hold">
-                      <p:stCondLst>
-                        <p:cond delay="indefinite"/>
-                      </p:stCondLst>
-                      <p:childTnLst>
-                        <p:par>
-                          <p:cTn id="5" fill="hold">
-                            <p:stCondLst>
-                              <p:cond delay="0"/>
-                            </p:stCondLst>
-                            <p:childTnLst>
-                              <p:par>
-                                <p:cTn id="6" presetID="1" presetClass="entr" presetSubtype="0" fill="hold" grpId="1" nodeType="clickEffect">
-                                  <p:stCondLst>
-                                    <p:cond delay="0"/>
-                                  </p:stCondLst>
-                                  <p:childTnLst>
-                                    <p:set>
-                                      <p:cBhvr>
-                                        <p:cTn id="7" dur="1" fill="hold">
-                                          <p:stCondLst>
-                                            <p:cond delay="0"/>
-                                          </p:stCondLst>
-                                        </p:cTn>
-                                        <p:tgtEl>
-                                          <p:spTgt spid="14"/>
-                                        </p:tgtEl>
-                                        <p:attrNameLst>
-                                          <p:attrName>style.visibility</p:attrName>
-                                        </p:attrNameLst>
-                                      </p:cBhvr>
-                                      <p:to>
-                                        <p:strVal val="visible"/>
-                                      </p:to>
-                                    </p:set>
-                                  </p:childTnLst>
-                                </p:cTn>
-                              </p:par>
-                              <p:par>
-                                <p:cTn id="8" presetID="1" presetClass="entr" presetSubtype="0" fill="hold" grpId="2" nodeType="withEffect">
-                                  <p:stCondLst>
-                                    <p:cond delay="0"/>
-                                  </p:stCondLst>
-                                  <p:childTnLst>
-                                    <p:set>
-                                      <p:cBhvr>
-                                        <p:cTn id="9" dur="1" fill="hold">
-                                          <p:stCondLst>
-                                            <p:cond delay="0"/>
-                                          </p:stCondLst>
-                                        </p:cTn>
-                                        <p:tgtEl>
-                                          <p:spTgt spid="15"/>
-                                        </p:tgtEl>
-                                        <p:attrNameLst>
-                                          <p:attrName>style.visibility</p:attrName>
-                                        </p:attrNameLst>
-                                      </p:cBhvr>
-                                      <p:to>
-                                        <p:strVal val="visible"/>
-                                      </p:to>
-                                    </p:set>
-                                  </p:childTnLst>
-                                </p:cTn>
-                              </p:par>
-                            </p:childTnLst>
-                          </p:cTn>
-                        </p:par>
-                      </p:childTnLst>
-                    </p:cTn>
-                  </p:par>
-                  <p:par>
-                    <p:cTn id="10" fill="hold">
-                      <p:stCondLst>
-                        <p:cond delay="indefinite"/>
-                      </p:stCondLst>
-                      <p:childTnLst>
-                        <p:par>
-                          <p:cTn id="11" fill="hold">
-                            <p:stCondLst>
-                              <p:cond delay="0"/>
-                            </p:stCondLst>
-                            <p:childTnLst>
-                              <p:par>
-                                <p:cTn id="12" presetID="1" presetClass="entr" presetSubtype="0" fill="hold" grpId="3" nodeType="clickEffect">
-                                  <p:stCondLst>
-                                    <p:cond delay="0"/>
-                                  </p:stCondLst>
-                                  <p:childTnLst>
-                                    <p:set>
-                                      <p:cBhvr>
-                                        <p:cTn id="13" dur="1" fill="hold">
-                                          <p:stCondLst>
-                                            <p:cond delay="0"/>
-                                          </p:stCondLst>
-                                        </p:cTn>
-                                        <p:tgtEl>
-                                          <p:spTgt spid="17"/>
-                                        </p:tgtEl>
-                                        <p:attrNameLst>
-                                          <p:attrName>style.visibility</p:attrName>
-                                        </p:attrNameLst>
-                                      </p:cBhvr>
-                                      <p:to>
-                                        <p:strVal val="visible"/>
-                                      </p:to>
-                                    </p:set>
-                                  </p:childTnLst>
-                                </p:cTn>
-                              </p:par>
-                            </p:childTnLst>
-                          </p:cTn>
-                        </p:par>
-                        <p:par>
-                          <p:cTn id="14" fill="hold">
-                            <p:stCondLst>
-                              <p:cond delay="0"/>
-                            </p:stCondLst>
-                            <p:childTnLst>
-                              <p:par>
-                                <p:cTn id="15" presetID="1" presetClass="entr" presetSubtype="0" fill="hold" grpId="4" nodeType="afterEffect">
-                                  <p:stCondLst>
-                                    <p:cond delay="1000"/>
-                                  </p:stCondLst>
-                                  <p:childTnLst>
-                                    <p:set>
-                                      <p:cBhvr>
-                                        <p:cTn id="16" dur="1" fill="hold">
-                                          <p:stCondLst>
-                                            <p:cond delay="0"/>
-                                          </p:stCondLst>
-                                        </p:cTn>
-                                        <p:tgtEl>
-                                          <p:spTgt spid="16"/>
-                                        </p:tgtEl>
-                                        <p:attrNameLst>
-                                          <p:attrName>style.visibility</p:attrName>
-                                        </p:attrNameLst>
-                                      </p:cBhvr>
-                                      <p:to>
-                                        <p:strVal val="visible"/>
-                                      </p:to>
-                                    </p:set>
-                                  </p:childTnLst>
-                                </p:cTn>
-                              </p:par>
-                              <p:par>
-                                <p:cTn id="17" presetID="1" presetClass="entr" presetSubtype="0" fill="hold" grpId="5" nodeType="withEffect">
-                                  <p:stCondLst>
-                                    <p:cond delay="0"/>
-                                  </p:stCondLst>
-                                  <p:childTnLst>
-                                    <p:set>
-                                      <p:cBhvr>
-                                        <p:cTn id="18" dur="1" fill="hold">
-                                          <p:stCondLst>
-                                            <p:cond delay="0"/>
-                                          </p:stCondLst>
-                                        </p:cTn>
-                                        <p:tgtEl>
-                                          <p:spTgt spid="19"/>
-                                        </p:tgtEl>
-                                        <p:attrNameLst>
-                                          <p:attrName>style.visibility</p:attrName>
-                                        </p:attrNameLst>
-                                      </p:cBhvr>
-                                      <p:to>
-                                        <p:strVal val="visible"/>
-                                      </p:to>
-                                    </p:set>
-                                  </p:childTnLst>
-                                </p:cTn>
-                              </p:par>
-                            </p:childTnLst>
-                          </p:cTn>
-                        </p:par>
-                        <p:par>
-                          <p:cTn id="19" fill="hold">
-                            <p:stCondLst>
-                              <p:cond delay="1000"/>
-                            </p:stCondLst>
-                            <p:childTnLst>
-                              <p:par>
-                                <p:cTn id="20" presetID="1" presetClass="entr" presetSubtype="0" fill="hold" grpId="6" nodeType="afterEffect">
-                                  <p:stCondLst>
-                                    <p:cond delay="1000"/>
-                                  </p:stCondLst>
-                                  <p:childTnLst>
-                                    <p:set>
-                                      <p:cBhvr>
-                                        <p:cTn id="21" dur="1" fill="hold">
-                                          <p:stCondLst>
-                                            <p:cond delay="0"/>
-                                          </p:stCondLst>
-                                        </p:cTn>
-                                        <p:tgtEl>
-                                          <p:spTgt spid="18"/>
-                                        </p:tgtEl>
-                                        <p:attrNameLst>
-                                          <p:attrName>style.visibility</p:attrName>
-                                        </p:attrNameLst>
-                                      </p:cBhvr>
-                                      <p:to>
-                                        <p:strVal val="visible"/>
-                                      </p:to>
-                                    </p:set>
-                                  </p:childTnLst>
-                                </p:cTn>
-                              </p:par>
-                            </p:childTnLst>
-                          </p:cTn>
-                        </p:par>
-                      </p:childTnLst>
-                    </p:cTn>
-                  </p:par>
-                  <p:par>
-                    <p:cTn id="22" fill="hold">
-                      <p:stCondLst>
-                        <p:cond delay="indefinite"/>
-                      </p:stCondLst>
-                      <p:childTnLst>
-                        <p:par>
-                          <p:cTn id="23" fill="hold">
-                            <p:stCondLst>
-                              <p:cond delay="0"/>
-                            </p:stCondLst>
-                            <p:childTnLst>
-                              <p:par>
-                                <p:cTn id="24" presetID="1" presetClass="entr" presetSubtype="0" fill="hold" grpId="7" nodeType="clickEffect">
-                                  <p:stCondLst>
-                                    <p:cond delay="0"/>
-                                  </p:stCondLst>
-                                  <p:childTnLst>
-                                    <p:set>
-                                      <p:cBhvr>
-                                        <p:cTn id="25" dur="1" fill="hold">
-                                          <p:stCondLst>
-                                            <p:cond delay="0"/>
-                                          </p:stCondLst>
-                                        </p:cTn>
-                                        <p:tgtEl>
-                                          <p:spTgt spid="20"/>
-                                        </p:tgtEl>
-                                        <p:attrNameLst>
-                                          <p:attrName>style.visibility</p:attrName>
-                                        </p:attrNameLst>
-                                      </p:cBhvr>
-                                      <p:to>
-                                        <p:strVal val="visible"/>
-                                      </p:to>
-                                    </p:set>
-                                  </p:childTnLst>
-                                </p:cTn>
-                              </p:par>
-                              <p:par>
-                                <p:cTn id="26" presetID="0" presetClass="path" presetSubtype="0" accel="0" decel="0" fill="hold" grpId="8" nodeType="withEffect">
-                                  <p:stCondLst>
-                                    <p:cond delay="0"/>
-                                  </p:stCondLst>
-                                  <p:childTnLst>
-                                    <p:animMotion origin="layout" path="M 0.000 0.000 L 0.698 0.186 " pathEditMode="relative" ptsTypes="AA">
-                                      <p:cBhvr>
-                                        <p:cTn id="27" dur="5099" fill="hold">
-                                          <p:stCondLst>
-                                            <p:cond delay="0"/>
-                                          </p:stCondLst>
-                                        </p:cTn>
-                                        <p:tgtEl>
-                                          <p:spTgt spid="15"/>
+                                          <p:spTgt spid="6"/>
                                         </p:tgtEl>
                                         <p:attrNameLst>
                                           <p:attrName>ppt_x</p:attrName>
@@ -6130,14 +4290,8 @@
       </p:par>
     </p:tnLst>
     <p:bldLst>
-      <p:bldP spid="14" grpId="9" animBg="1"/>
-      <p:bldP spid="15" grpId="10" animBg="1"/>
-      <p:bldP spid="17" grpId="11" animBg="1"/>
-      <p:bldP spid="16" grpId="12" animBg="1"/>
-      <p:bldP spid="19" grpId="13" animBg="1"/>
-      <p:bldP spid="18" grpId="14" animBg="1"/>
-      <p:bldP spid="20" grpId="15" animBg="1"/>
-      <p:bldP spid="15" grpId="16" animBg="1"/>
+      <p:bldP spid="2" grpId="3" animBg="1"/>
+      <p:bldP spid="6" grpId="4" animBg="1"/>
     </p:bldLst>
   </p:timing>
 </p:sld>

</xml_diff>

<commit_message>
Example added in chapter 3
</commit_message>
<xml_diff>
--- a/test/bin/PPSimpleExamples.pptx
+++ b/test/bin/PPSimpleExamples.pptx
@@ -3856,7 +3856,7 @@
                 <a:latin typeface="Times New Roman"/>
                 <a:cs typeface="Times New Roman"/>
               </a:rPr>
-              <a:t>Sorting</a:t>
+              <a:t>Selection Sorting</a:t>
             </a:r>
             <a:endParaRPr lang="en-US" sz="4000" dirty="0">
               <a:solidFill>
@@ -3876,7 +3876,7 @@
         </p:nvSpPr>
         <p:spPr bwMode="auto">
           <a:xfrm>
-            <a:off x="2560000" y="2560000"/>
+            <a:off x="3814400" y="1920000"/>
             <a:ext cx="179200" cy="371200"/>
           </a:xfrm>
           <a:prstGeom prst="rect">
@@ -3936,7 +3936,7 @@
         </p:nvSpPr>
         <p:spPr bwMode="auto">
           <a:xfrm>
-            <a:off x="2944000" y="2560000"/>
+            <a:off x="4198400" y="1920000"/>
             <a:ext cx="179200" cy="371200"/>
           </a:xfrm>
           <a:prstGeom prst="rect">
@@ -3996,7 +3996,7 @@
         </p:nvSpPr>
         <p:spPr bwMode="auto">
           <a:xfrm>
-            <a:off x="3328000" y="2560000"/>
+            <a:off x="4582400" y="1920000"/>
             <a:ext cx="179200" cy="371200"/>
           </a:xfrm>
           <a:prstGeom prst="rect">
@@ -4056,7 +4056,7 @@
         </p:nvSpPr>
         <p:spPr bwMode="auto">
           <a:xfrm>
-            <a:off x="3712000" y="2560000"/>
+            <a:off x="4966400" y="1920000"/>
             <a:ext cx="179200" cy="371200"/>
           </a:xfrm>
           <a:prstGeom prst="rect">
@@ -4116,7 +4116,7 @@
         </p:nvSpPr>
         <p:spPr bwMode="auto">
           <a:xfrm>
-            <a:off x="4096000" y="2560000"/>
+            <a:off x="5350400" y="1920000"/>
             <a:ext cx="179200" cy="371200"/>
           </a:xfrm>
           <a:prstGeom prst="rect">
@@ -4200,9 +4200,34 @@
                                     <p:cond delay="0"/>
                                   </p:stCondLst>
                                   <p:childTnLst>
-                                    <p:animMotion origin="layout" path="M 0.000 0.000 L 0.168 0.000 " pathEditMode="relative" ptsTypes="AA">
+                                    <p:animMotion origin="layout" path="M 0.000 0.000 L -0.168 0.000 " pathEditMode="relative" ptsTypes="AA">
                                       <p:cBhvr>
                                         <p:cTn id="7" dur="1200" fill="hold">
+                                          <p:stCondLst>
+                                            <p:cond delay="0"/>
+                                          </p:stCondLst>
+                                        </p:cTn>
+                                        <p:tgtEl>
+                                          <p:spTgt spid="6"/>
+                                        </p:tgtEl>
+                                        <p:attrNameLst>
+                                          <p:attrName>ppt_x</p:attrName>
+                                          <p:attrName>ppt_y</p:attrName>
+                                        </p:attrNameLst>
+                                      </p:cBhvr>
+                                    </p:animMotion>
+                                  </p:childTnLst>
+                                </p:cTn>
+                              </p:par>
+                              <p:par>
+                                <p:cTn id="8" presetID="0" presetClass="path" presetSubtype="0" accel="0" decel="0" fill="hold" grpId="2" nodeType="withEffect">
+                                  <p:stCondLst>
+                                    <p:cond delay="0"/>
+                                  </p:stCondLst>
+                                  <p:childTnLst>
+                                    <p:animMotion origin="layout" path="M 0.000 0.000 L 0.042 0.000 " pathEditMode="relative" ptsTypes="AA">
+                                      <p:cBhvr>
+                                        <p:cTn id="9" dur="300" fill="hold">
                                           <p:stCondLst>
                                             <p:cond delay="0"/>
                                           </p:stCondLst>
@@ -4219,39 +4244,71 @@
                                   </p:childTnLst>
                                 </p:cTn>
                               </p:par>
-                            </p:childTnLst>
-                          </p:cTn>
-                        </p:par>
-                      </p:childTnLst>
-                    </p:cTn>
-                  </p:par>
-                  <p:par>
-                    <p:cTn id="8" fill="hold">
-                      <p:stCondLst>
-                        <p:cond delay="indefinite"/>
-                      </p:stCondLst>
-                      <p:childTnLst>
-                        <p:par>
-                          <p:cTn id="9" fill="hold">
-                            <p:stCondLst>
-                              <p:cond delay="0"/>
-                            </p:stCondLst>
-                            <p:childTnLst>
                               <p:par>
-                                <p:cTn id="10" presetID="0" presetClass="path" presetSubtype="0" accel="0" decel="0" fill="hold" grpId="2" nodeType="clickEffect">
+                                <p:cTn id="10" presetID="0" presetClass="path" presetSubtype="0" accel="0" decel="0" fill="hold" grpId="3" nodeType="withEffect">
                                   <p:stCondLst>
                                     <p:cond delay="0"/>
                                   </p:stCondLst>
                                   <p:childTnLst>
-                                    <p:animMotion origin="layout" path="M 0.000 0.000 L -0.168 0.000 " pathEditMode="relative" ptsTypes="AA">
+                                    <p:animMotion origin="layout" path="M 0.000 0.000 L 0.042 0.000 " pathEditMode="relative" ptsTypes="AA">
                                       <p:cBhvr>
-                                        <p:cTn id="11" dur="1200" fill="hold">
+                                        <p:cTn id="11" dur="300" fill="hold">
                                           <p:stCondLst>
                                             <p:cond delay="0"/>
                                           </p:stCondLst>
                                         </p:cTn>
                                         <p:tgtEl>
-                                          <p:spTgt spid="6"/>
+                                          <p:spTgt spid="3"/>
+                                        </p:tgtEl>
+                                        <p:attrNameLst>
+                                          <p:attrName>ppt_x</p:attrName>
+                                          <p:attrName>ppt_y</p:attrName>
+                                        </p:attrNameLst>
+                                      </p:cBhvr>
+                                    </p:animMotion>
+                                  </p:childTnLst>
+                                </p:cTn>
+                              </p:par>
+                              <p:par>
+                                <p:cTn id="12" presetID="0" presetClass="path" presetSubtype="0" accel="0" decel="0" fill="hold" grpId="4" nodeType="withEffect">
+                                  <p:stCondLst>
+                                    <p:cond delay="0"/>
+                                  </p:stCondLst>
+                                  <p:childTnLst>
+                                    <p:animMotion origin="layout" path="M 0.000 0.000 L 0.042 0.000 " pathEditMode="relative" ptsTypes="AA">
+                                      <p:cBhvr>
+                                        <p:cTn id="13" dur="300" fill="hold">
+                                          <p:stCondLst>
+                                            <p:cond delay="0"/>
+                                          </p:stCondLst>
+                                        </p:cTn>
+                                        <p:tgtEl>
+                                          <p:spTgt spid="4"/>
+                                        </p:tgtEl>
+                                        <p:attrNameLst>
+                                          <p:attrName>ppt_x</p:attrName>
+                                          <p:attrName>ppt_y</p:attrName>
+                                        </p:attrNameLst>
+                                      </p:cBhvr>
+                                    </p:animMotion>
+                                  </p:childTnLst>
+                                </p:cTn>
+                              </p:par>
+                              <p:par>
+                                <p:cTn id="14" presetID="0" presetClass="path" presetSubtype="0" accel="0" decel="0" fill="hold" grpId="5" nodeType="withEffect">
+                                  <p:stCondLst>
+                                    <p:cond delay="0"/>
+                                  </p:stCondLst>
+                                  <p:childTnLst>
+                                    <p:animMotion origin="layout" path="M 0.000 0.000 L 0.042 0.000 " pathEditMode="relative" ptsTypes="AA">
+                                      <p:cBhvr>
+                                        <p:cTn id="15" dur="300" fill="hold">
+                                          <p:stCondLst>
+                                            <p:cond delay="0"/>
+                                          </p:stCondLst>
+                                        </p:cTn>
+                                        <p:tgtEl>
+                                          <p:spTgt spid="5"/>
                                         </p:tgtEl>
                                         <p:attrNameLst>
                                           <p:attrName>ppt_x</p:attrName>
@@ -4290,8 +4347,11 @@
       </p:par>
     </p:tnLst>
     <p:bldLst>
-      <p:bldP spid="2" grpId="3" animBg="1"/>
-      <p:bldP spid="6" grpId="4" animBg="1"/>
+      <p:bldP spid="6" grpId="6" animBg="1"/>
+      <p:bldP spid="2" grpId="7" animBg="1"/>
+      <p:bldP spid="3" grpId="8" animBg="1"/>
+      <p:bldP spid="4" grpId="9" animBg="1"/>
+      <p:bldP spid="5" grpId="10" animBg="1"/>
     </p:bldLst>
   </p:timing>
 </p:sld>

</xml_diff>

<commit_message>
Bezier Curve Working on Rect
</commit_message>
<xml_diff>
--- a/test/bin/PPSimpleExamples.pptx
+++ b/test/bin/PPSimpleExamples.pptx
@@ -3876,7 +3876,7 @@
         </p:nvSpPr>
         <p:spPr bwMode="auto">
           <a:xfrm>
-            <a:off x="2560000" y="1280000"/>
+            <a:off x="640000" y="640000"/>
             <a:ext cx="1280000" cy="1280000"/>
           </a:xfrm>
           <a:prstGeom prst="rect">
@@ -3971,9 +3971,9 @@
                                     <p:cond delay="0"/>
                                   </p:stCondLst>
                                   <p:childTnLst>
-                                    <p:animMotion origin="layout" path="M 0.000 0.000 C 0.140 0.559 0.419 0.931 -0.140 0.000 " pathEditMode="relative" ptsTypes="AA">
+                                    <p:animMotion origin="layout" path="M 0.000 0.000 C 0.349 0.652 0.628 1.024 0.209 0.279 " pathEditMode="relative" ptsTypes="AA">
                                       <p:cBhvr>
-                                        <p:cTn id="7" dur="1000" fill="hold">
+                                        <p:cTn id="7" dur="2121" fill="hold">
                                           <p:stCondLst>
                                             <p:cond delay="0"/>
                                           </p:stCondLst>

</xml_diff>

<commit_message>
Bezier Working for Oval, almost perfect
</commit_message>
<xml_diff>
--- a/test/bin/PPSimpleExamples.pptx
+++ b/test/bin/PPSimpleExamples.pptx
@@ -3870,16 +3870,16 @@
       </p:sp>
       <p:sp>
         <p:nvSpPr>
-          <p:cNvPr id="2" name="PPRect#2"/>
+          <p:cNvPr id="2" name="PPOval#2"/>
           <p:cNvSpPr/>
           <p:nvPr/>
         </p:nvSpPr>
         <p:spPr bwMode="auto">
           <a:xfrm>
             <a:off x="640000" y="640000"/>
-            <a:ext cx="1280000" cy="1280000"/>
+            <a:ext cx="640000" cy="640000"/>
           </a:xfrm>
-          <a:prstGeom prst="rect">
+          <a:prstGeom prst="ellipse">
             <a:avLst/>
           </a:prstGeom>
           <a:solidFill>
@@ -3971,9 +3971,9 @@
                                     <p:cond delay="0"/>
                                   </p:stCondLst>
                                   <p:childTnLst>
-                                    <p:animMotion origin="layout" path="M 0.000 0.000 C 0.349 0.652 0.628 1.024 0.209 0.279 " pathEditMode="relative" ptsTypes="AA">
+                                    <p:animMotion origin="layout" path="M 0.000 0.000 C 0.070 1.024 0.908 1.024 0.349 0.652 " pathEditMode="relative" ptsTypes="AA">
                                       <p:cBhvr>
-                                        <p:cTn id="7" dur="2121" fill="hold">
+                                        <p:cTn id="7" dur="4301" fill="hold">
                                           <p:stCondLst>
                                             <p:cond delay="0"/>
                                           </p:stCondLst>

</xml_diff>